<commit_message>
First 36 slides completed.
</commit_message>
<xml_diff>
--- a/Diving into C++ linker.pptx
+++ b/Diving into C++ linker.pptx
@@ -201,7 +201,7 @@
   </p:defaultTextStyle>
   <p:extLst>
     <p:ext uri="{EFAFB233-063F-42B5-8137-9DF3F51BA10A}">
-      <p15:sldGuideLst xmlns="" xmlns:p15="http://schemas.microsoft.com/office/powerpoint/2012/main">
+      <p15:sldGuideLst xmlns:p15="http://schemas.microsoft.com/office/powerpoint/2012/main" xmlns="">
         <p15:guide id="1" orient="horz" pos="1620">
           <p15:clr>
             <a:srgbClr val="A4A3A4"/>
@@ -215,7 +215,7 @@
       </p15:sldGuideLst>
     </p:ext>
     <p:ext uri="{2D200454-40CA-4A62-9FC3-DE9A4176ACB9}">
-      <p15:notesGuideLst xmlns="" xmlns:p15="http://schemas.microsoft.com/office/powerpoint/2012/main">
+      <p15:notesGuideLst xmlns:p15="http://schemas.microsoft.com/office/powerpoint/2012/main" xmlns="">
         <p15:guide id="1" orient="horz" pos="2880">
           <p15:clr>
             <a:srgbClr val="A4A3A4"/>
@@ -343,7 +343,7 @@
               <a:pPr>
                 <a:defRPr/>
               </a:pPr>
-              <a:t>27-Jul-15</a:t>
+              <a:t>28-Jul-15</a:t>
             </a:fld>
             <a:endParaRPr lang="en-US"/>
           </a:p>
@@ -447,7 +447,7 @@
     </p:spTree>
     <p:extLst>
       <p:ext uri="{BB962C8B-B14F-4D97-AF65-F5344CB8AC3E}">
-        <p14:creationId xmlns="" xmlns:p14="http://schemas.microsoft.com/office/powerpoint/2010/main" val="3867598621"/>
+        <p14:creationId xmlns:p14="http://schemas.microsoft.com/office/powerpoint/2010/main" xmlns="" val="3867598621"/>
       </p:ext>
     </p:extLst>
   </p:cSld>
@@ -567,7 +567,7 @@
               <a:pPr>
                 <a:defRPr/>
               </a:pPr>
-              <a:t>27-Jul-15</a:t>
+              <a:t>28-Jul-15</a:t>
             </a:fld>
             <a:endParaRPr lang="en-US"/>
           </a:p>
@@ -768,7 +768,7 @@
     </p:spTree>
     <p:extLst>
       <p:ext uri="{BB962C8B-B14F-4D97-AF65-F5344CB8AC3E}">
-        <p14:creationId xmlns="" xmlns:p14="http://schemas.microsoft.com/office/powerpoint/2010/main" val="977992471"/>
+        <p14:creationId xmlns:p14="http://schemas.microsoft.com/office/powerpoint/2010/main" xmlns="" val="977992471"/>
       </p:ext>
     </p:extLst>
   </p:cSld>
@@ -994,7 +994,7 @@
     </p:spTree>
     <p:extLst>
       <p:ext uri="{BB962C8B-B14F-4D97-AF65-F5344CB8AC3E}">
-        <p14:creationId xmlns="" xmlns:p14="http://schemas.microsoft.com/office/powerpoint/2010/main" val="3180054805"/>
+        <p14:creationId xmlns:p14="http://schemas.microsoft.com/office/powerpoint/2010/main" xmlns="" val="3180054805"/>
       </p:ext>
     </p:extLst>
   </p:cSld>
@@ -1099,7 +1099,7 @@
     </p:spTree>
     <p:extLst>
       <p:ext uri="{BB962C8B-B14F-4D97-AF65-F5344CB8AC3E}">
-        <p14:creationId xmlns="" xmlns:p14="http://schemas.microsoft.com/office/powerpoint/2010/main" val="3180054805"/>
+        <p14:creationId xmlns:p14="http://schemas.microsoft.com/office/powerpoint/2010/main" xmlns="" val="3180054805"/>
       </p:ext>
     </p:extLst>
   </p:cSld>
@@ -1378,7 +1378,7 @@
     </p:spTree>
     <p:extLst>
       <p:ext uri="{BB962C8B-B14F-4D97-AF65-F5344CB8AC3E}">
-        <p14:creationId xmlns="" xmlns:p14="http://schemas.microsoft.com/office/powerpoint/2010/main" val="3180054805"/>
+        <p14:creationId xmlns:p14="http://schemas.microsoft.com/office/powerpoint/2010/main" xmlns="" val="3180054805"/>
       </p:ext>
     </p:extLst>
   </p:cSld>
@@ -1434,14 +1434,6 @@
           </a:bodyPr>
           <a:lstStyle/>
           <a:p>
-            <a:r>
-              <a:rPr lang="en-US" dirty="0" smtClean="0"/>
-              <a:t>Dynamic libraries</a:t>
-            </a:r>
-            <a:r>
-              <a:rPr lang="en-US" baseline="0" dirty="0" smtClean="0"/>
-              <a:t> also can be used like building blocks for different processes but they can be shared in runtime.</a:t>
-            </a:r>
             <a:endParaRPr lang="en-US" dirty="0"/>
           </a:p>
         </p:txBody>
@@ -1529,45 +1521,6 @@
           </a:bodyPr>
           <a:lstStyle/>
           <a:p>
-            <a:r>
-              <a:rPr lang="en-US" dirty="0" smtClean="0"/>
-              <a:t>Static libraries allow you to call any methods from the libraries</a:t>
-            </a:r>
-            <a:r>
-              <a:rPr lang="en-US" baseline="0" dirty="0" smtClean="0"/>
-              <a:t> you want and C++ syntax allow you to do.</a:t>
-            </a:r>
-            <a:endParaRPr lang="en-US" dirty="0" smtClean="0"/>
-          </a:p>
-          <a:p>
-            <a:r>
-              <a:rPr lang="en-US" dirty="0" smtClean="0"/>
-              <a:t>By default shared libraries do not export all the symbols. In Linux it is done automatically , but not in Windows. In Win you should do it manually.</a:t>
-            </a:r>
-          </a:p>
-          <a:p>
-            <a:r>
-              <a:rPr lang="en-US" dirty="0" smtClean="0"/>
-              <a:t>We</a:t>
-            </a:r>
-            <a:r>
-              <a:rPr lang="en-US" baseline="0" dirty="0" smtClean="0"/>
-              <a:t> can consider </a:t>
-            </a:r>
-            <a:r>
-              <a:rPr lang="en-US" baseline="0" dirty="0" err="1" smtClean="0"/>
-              <a:t>dll</a:t>
-            </a:r>
-            <a:r>
-              <a:rPr lang="en-US" baseline="0" dirty="0" smtClean="0"/>
-              <a:t> as an API. You can share those functions that you want.</a:t>
-            </a:r>
-          </a:p>
-          <a:p>
-            <a:r>
-              <a:rPr lang="en-US" baseline="0" dirty="0" smtClean="0"/>
-              <a:t>To specify export symbols…</a:t>
-            </a:r>
             <a:endParaRPr lang="en-US" dirty="0"/>
           </a:p>
         </p:txBody>
@@ -1655,14 +1608,6 @@
           </a:bodyPr>
           <a:lstStyle/>
           <a:p>
-            <a:r>
-              <a:rPr lang="en-US" dirty="0" smtClean="0"/>
-              <a:t>On Linux</a:t>
-            </a:r>
-            <a:r>
-              <a:rPr lang="en-US" baseline="0" dirty="0" smtClean="0"/>
-              <a:t> there is no difference from static library linking.</a:t>
-            </a:r>
             <a:endParaRPr lang="en-US" dirty="0"/>
           </a:p>
         </p:txBody>
@@ -1750,14 +1695,6 @@
           </a:bodyPr>
           <a:lstStyle/>
           <a:p>
-            <a:r>
-              <a:rPr lang="en-US" dirty="0" smtClean="0"/>
-              <a:t>On Linux</a:t>
-            </a:r>
-            <a:r>
-              <a:rPr lang="en-US" baseline="0" dirty="0" smtClean="0"/>
-              <a:t> there is no difference from static library linking.</a:t>
-            </a:r>
             <a:endParaRPr lang="en-US" dirty="0"/>
           </a:p>
         </p:txBody>
@@ -2907,7 +2844,7 @@
           <a:blip r:embed="rId3">
             <a:extLst>
               <a:ext uri="{28A0092B-C50C-407E-A947-70E740481C1C}">
-                <a14:useLocalDpi xmlns:a14="http://schemas.microsoft.com/office/drawing/2010/main" xmlns="" val="0"/>
+                <a14:useLocalDpi xmlns="" xmlns:a14="http://schemas.microsoft.com/office/drawing/2010/main" val="0"/>
               </a:ext>
             </a:extLst>
           </a:blip>
@@ -3125,7 +3062,7 @@
           <a:blip r:embed="rId3">
             <a:extLst>
               <a:ext uri="{28A0092B-C50C-407E-A947-70E740481C1C}">
-                <a14:useLocalDpi xmlns:a14="http://schemas.microsoft.com/office/drawing/2010/main" xmlns="" val="0"/>
+                <a14:useLocalDpi xmlns="" xmlns:a14="http://schemas.microsoft.com/office/drawing/2010/main" val="0"/>
               </a:ext>
             </a:extLst>
           </a:blip>
@@ -5416,7 +5353,7 @@
               <a:pPr>
                 <a:defRPr/>
               </a:pPr>
-              <a:t>27/07/2015</a:t>
+              <a:t>28/07/2015</a:t>
             </a:fld>
             <a:endParaRPr lang="en-GB" sz="800" dirty="0">
               <a:solidFill>
@@ -7621,7 +7558,7 @@
               <a:pPr>
                 <a:defRPr/>
               </a:pPr>
-              <a:t>27/07/2015</a:t>
+              <a:t>28/07/2015</a:t>
             </a:fld>
             <a:endParaRPr lang="en-GB" sz="800" dirty="0">
               <a:latin typeface="+mn-lt"/>
@@ -14864,27 +14801,7 @@
                 <a:ea typeface="ヒラギノ角ゴ Pro W3" charset="0"/>
                 <a:cs typeface="Consolas" pitchFamily="49" charset="0"/>
               </a:rPr>
-              <a:t>According to </a:t>
-            </a:r>
-            <a:r>
-              <a:rPr lang="en-US" sz="1400" dirty="0" smtClean="0">
-                <a:solidFill>
-                  <a:schemeClr val="bg2"/>
-                </a:solidFill>
-                <a:ea typeface="ヒラギノ角ゴ Pro W3" charset="0"/>
-                <a:cs typeface="Consolas" pitchFamily="49" charset="0"/>
-              </a:rPr>
-              <a:t>C++ standard (ISO/IEC N4527</a:t>
-            </a:r>
-            <a:r>
-              <a:rPr lang="en-US" sz="1400" dirty="0" smtClean="0">
-                <a:solidFill>
-                  <a:schemeClr val="bg2"/>
-                </a:solidFill>
-                <a:ea typeface="ヒラギノ角ゴ Pro W3" charset="0"/>
-                <a:cs typeface="Consolas" pitchFamily="49" charset="0"/>
-              </a:rPr>
-              <a:t>):</a:t>
+              <a:t>According to C++ standard (ISO/IEC N4527):</a:t>
             </a:r>
           </a:p>
           <a:p>
@@ -14918,8 +14835,16 @@
                 <a:ea typeface="ヒラギノ角ゴ Pro W3" charset="0"/>
                 <a:cs typeface="Consolas" pitchFamily="49" charset="0"/>
               </a:rPr>
-              <a:t>§3.2 One definition </a:t>
-            </a:r>
+              <a:t>§3.2 One definition rule</a:t>
+            </a:r>
+          </a:p>
+          <a:p>
+            <a:pPr marL="458788" lvl="1" indent="-228600">
+              <a:spcAft>
+                <a:spcPts val="0"/>
+              </a:spcAft>
+              <a:defRPr/>
+            </a:pPr>
             <a:r>
               <a:rPr lang="en-US" sz="1400" i="1" dirty="0" smtClean="0">
                 <a:solidFill>
@@ -14929,7 +14854,7 @@
                 <a:ea typeface="ヒラギノ角ゴ Pro W3" charset="0"/>
                 <a:cs typeface="Consolas" pitchFamily="49" charset="0"/>
               </a:rPr>
-              <a:t>rule</a:t>
+              <a:t>...</a:t>
             </a:r>
           </a:p>
           <a:p>
@@ -14948,70 +14873,7 @@
                 <a:ea typeface="ヒラギノ角ゴ Pro W3" charset="0"/>
                 <a:cs typeface="Consolas" pitchFamily="49" charset="0"/>
               </a:rPr>
-              <a:t>...</a:t>
-            </a:r>
-          </a:p>
-          <a:p>
-            <a:pPr marL="458788" lvl="1" indent="-228600">
-              <a:spcAft>
-                <a:spcPts val="0"/>
-              </a:spcAft>
-              <a:defRPr/>
-            </a:pPr>
-            <a:r>
-              <a:rPr lang="en-US" sz="1400" i="1" dirty="0" smtClean="0">
-                <a:solidFill>
-                  <a:schemeClr val="bg2"/>
-                </a:solidFill>
-                <a:latin typeface="+mn-lt"/>
-                <a:ea typeface="ヒラギノ角ゴ Pro W3" charset="0"/>
-                <a:cs typeface="Consolas" pitchFamily="49" charset="0"/>
-              </a:rPr>
-              <a:t>(6)There can be more than one definition of a class type </a:t>
-            </a:r>
-            <a:r>
-              <a:rPr lang="en-US" sz="1400" i="1" dirty="0" smtClean="0">
-                <a:solidFill>
-                  <a:schemeClr val="bg2"/>
-                </a:solidFill>
-                <a:latin typeface="+mn-lt"/>
-                <a:ea typeface="ヒラギノ角ゴ Pro W3" charset="0"/>
-                <a:cs typeface="Consolas" pitchFamily="49" charset="0"/>
-              </a:rPr>
-              <a:t>(…) with external </a:t>
-            </a:r>
-            <a:r>
-              <a:rPr lang="en-US" sz="1400" i="1" dirty="0" smtClean="0">
-                <a:solidFill>
-                  <a:schemeClr val="bg2"/>
-                </a:solidFill>
-                <a:latin typeface="+mn-lt"/>
-                <a:ea typeface="ヒラギノ角ゴ Pro W3" charset="0"/>
-                <a:cs typeface="Consolas" pitchFamily="49" charset="0"/>
-              </a:rPr>
-              <a:t>linkage. … </a:t>
-            </a:r>
-            <a:r>
-              <a:rPr lang="en-US" sz="1400" i="1" dirty="0" smtClean="0">
-                <a:solidFill>
-                  <a:schemeClr val="bg2"/>
-                </a:solidFill>
-                <a:latin typeface="+mn-lt"/>
-                <a:ea typeface="ヒラギノ角ゴ Pro W3" charset="0"/>
-                <a:cs typeface="Consolas" pitchFamily="49" charset="0"/>
-              </a:rPr>
-              <a:t>Given such </a:t>
-            </a:r>
-            <a:r>
-              <a:rPr lang="en-US" sz="1400" i="1" dirty="0" smtClean="0">
-                <a:solidFill>
-                  <a:schemeClr val="bg2"/>
-                </a:solidFill>
-                <a:latin typeface="+mn-lt"/>
-                <a:ea typeface="ヒラギノ角ゴ Pro W3" charset="0"/>
-                <a:cs typeface="Consolas" pitchFamily="49" charset="0"/>
-              </a:rPr>
-              <a:t>an entity named D defined in more than one translation unit, then:</a:t>
+              <a:t>(6)There can be more than one definition of a class type (…) with external linkage. … Given such an entity named D defined in more than one translation unit, then:</a:t>
             </a:r>
           </a:p>
           <a:p>
@@ -15084,95 +14946,7 @@
                 <a:ea typeface="ヒラギノ角ゴ Pro W3" charset="0"/>
                 <a:cs typeface="Consolas" pitchFamily="49" charset="0"/>
               </a:rPr>
-              <a:t>If the definitions of D satisfy all these </a:t>
-            </a:r>
-            <a:r>
-              <a:rPr lang="en-US" sz="1400" i="1" dirty="0" smtClean="0">
-                <a:solidFill>
-                  <a:schemeClr val="bg2"/>
-                </a:solidFill>
-                <a:latin typeface="+mn-lt"/>
-                <a:ea typeface="ヒラギノ角ゴ Pro W3" charset="0"/>
-                <a:cs typeface="Consolas" pitchFamily="49" charset="0"/>
-              </a:rPr>
-              <a:t>requirements, then </a:t>
-            </a:r>
-            <a:r>
-              <a:rPr lang="en-US" sz="1400" i="1" dirty="0" smtClean="0">
-                <a:solidFill>
-                  <a:schemeClr val="bg2"/>
-                </a:solidFill>
-                <a:latin typeface="+mn-lt"/>
-                <a:ea typeface="ヒラギノ角ゴ Pro W3" charset="0"/>
-                <a:cs typeface="Consolas" pitchFamily="49" charset="0"/>
-              </a:rPr>
-              <a:t>the behavior is as if there were </a:t>
-            </a:r>
-            <a:r>
-              <a:rPr lang="en-US" sz="1400" i="1" dirty="0" smtClean="0">
-                <a:solidFill>
-                  <a:schemeClr val="bg2"/>
-                </a:solidFill>
-                <a:latin typeface="+mn-lt"/>
-                <a:ea typeface="ヒラギノ角ゴ Pro W3" charset="0"/>
-                <a:cs typeface="Consolas" pitchFamily="49" charset="0"/>
-              </a:rPr>
-              <a:t>a single </a:t>
-            </a:r>
-            <a:r>
-              <a:rPr lang="en-US" sz="1400" i="1" dirty="0" smtClean="0">
-                <a:solidFill>
-                  <a:schemeClr val="bg2"/>
-                </a:solidFill>
-                <a:latin typeface="+mn-lt"/>
-                <a:ea typeface="ヒラギノ角ゴ Pro W3" charset="0"/>
-                <a:cs typeface="Consolas" pitchFamily="49" charset="0"/>
-              </a:rPr>
-              <a:t>definition of </a:t>
-            </a:r>
-            <a:r>
-              <a:rPr lang="en-US" sz="1400" i="1" dirty="0" smtClean="0">
-                <a:solidFill>
-                  <a:schemeClr val="bg2"/>
-                </a:solidFill>
-                <a:latin typeface="+mn-lt"/>
-                <a:ea typeface="ヒラギノ角ゴ Pro W3" charset="0"/>
-                <a:cs typeface="Consolas" pitchFamily="49" charset="0"/>
-              </a:rPr>
-              <a:t>D</a:t>
-            </a:r>
-            <a:r>
-              <a:rPr lang="en-US" sz="1400" i="1" dirty="0" smtClean="0">
-                <a:solidFill>
-                  <a:schemeClr val="bg2"/>
-                </a:solidFill>
-                <a:latin typeface="+mn-lt"/>
-                <a:ea typeface="ヒラギノ角ゴ Pro W3" charset="0"/>
-                <a:cs typeface="Consolas" pitchFamily="49" charset="0"/>
-              </a:rPr>
-              <a:t>. If the definitions of D do not satisfy </a:t>
-            </a:r>
-            <a:r>
-              <a:rPr lang="en-US" sz="1400" i="1" dirty="0" smtClean="0">
-                <a:solidFill>
-                  <a:schemeClr val="bg2"/>
-                </a:solidFill>
-                <a:latin typeface="+mn-lt"/>
-                <a:ea typeface="ヒラギノ角ゴ Pro W3" charset="0"/>
-                <a:cs typeface="Consolas" pitchFamily="49" charset="0"/>
-              </a:rPr>
-              <a:t>these requirements</a:t>
-            </a:r>
-            <a:r>
-              <a:rPr lang="en-US" sz="1400" i="1" dirty="0" smtClean="0">
-                <a:solidFill>
-                  <a:schemeClr val="bg2"/>
-                </a:solidFill>
-                <a:latin typeface="+mn-lt"/>
-                <a:ea typeface="ヒラギノ角ゴ Pro W3" charset="0"/>
-                <a:cs typeface="Consolas" pitchFamily="49" charset="0"/>
-              </a:rPr>
-              <a:t>, then the behavior is undefined.</a:t>
+              <a:t>If the definitions of D satisfy all these requirements, then the behavior is as if there were a single definition of D. If the definitions of D do not satisfy these requirements, then the behavior is undefined.</a:t>
             </a:r>
             <a:endParaRPr lang="en-US" sz="3200" i="1" dirty="0" smtClean="0">
               <a:solidFill>
@@ -15233,14 +15007,7 @@
                 <a:latin typeface="+mn-lt"/>
                 <a:hlinkClick r:id="rId3"/>
               </a:rPr>
-              <a:t>http</a:t>
-            </a:r>
-            <a:r>
-              <a:rPr lang="en-US" dirty="0" smtClean="0">
-                <a:latin typeface="+mn-lt"/>
-                <a:hlinkClick r:id="rId3"/>
-              </a:rPr>
-              <a:t>://open-std.org/JTC1/SC22/WG21/docs/papers/2015/n4527.pdf</a:t>
+              <a:t>http://open-std.org/JTC1/SC22/WG21/docs/papers/2015/n4527.pdf</a:t>
             </a:r>
             <a:endParaRPr lang="en-US" dirty="0">
               <a:latin typeface="+mn-lt"/>
@@ -18024,18 +17791,7 @@
                 <a:ea typeface="ヒラギノ角ゴ Pro W3" charset="0"/>
                 <a:cs typeface="Consolas" pitchFamily="49" charset="0"/>
               </a:rPr>
-              <a:t>$ </a:t>
-            </a:r>
-            <a:r>
-              <a:rPr lang="en-US" sz="1400" dirty="0" smtClean="0">
-                <a:solidFill>
-                  <a:schemeClr val="bg2"/>
-                </a:solidFill>
-                <a:latin typeface="Consolas" pitchFamily="49" charset="0"/>
-                <a:ea typeface="ヒラギノ角ゴ Pro W3" charset="0"/>
-                <a:cs typeface="Consolas" pitchFamily="49" charset="0"/>
-              </a:rPr>
-              <a:t>./</a:t>
+              <a:t>$ ./</a:t>
             </a:r>
             <a:r>
               <a:rPr lang="en-US" sz="1400" dirty="0" err="1" smtClean="0">
@@ -18856,17 +18612,7 @@
                 <a:latin typeface="+mn-lt"/>
                 <a:ea typeface="ヒラギノ角ゴ Pro W3" charset="0"/>
               </a:rPr>
-              <a:t> </a:t>
-            </a:r>
-            <a:r>
-              <a:rPr lang="en-US" dirty="0" smtClean="0">
-                <a:solidFill>
-                  <a:schemeClr val="bg2"/>
-                </a:solidFill>
-                <a:latin typeface="+mn-lt"/>
-                <a:ea typeface="ヒラギノ角ゴ Pro W3" charset="0"/>
-              </a:rPr>
-              <a:t>as a static library:</a:t>
+              <a:t> as a static library:</a:t>
             </a:r>
             <a:endParaRPr kumimoji="0" lang="en-US" b="0" u="none" strike="noStrike" kern="1200" cap="none" spc="0" normalizeH="0" baseline="0" noProof="0" dirty="0" smtClean="0">
               <a:ln>
@@ -19665,17 +19411,7 @@
                 <a:latin typeface="+mn-lt"/>
                 <a:ea typeface="ヒラギノ角ゴ Pro W3" charset="0"/>
               </a:rPr>
-              <a:t> </a:t>
-            </a:r>
-            <a:r>
-              <a:rPr lang="en-US" dirty="0" smtClean="0">
-                <a:solidFill>
-                  <a:schemeClr val="bg2"/>
-                </a:solidFill>
-                <a:latin typeface="+mn-lt"/>
-                <a:ea typeface="ヒラギノ角ゴ Pro W3" charset="0"/>
-              </a:rPr>
-              <a:t>are included in static library.</a:t>
+              <a:t> are included in static library.</a:t>
             </a:r>
           </a:p>
           <a:p>
@@ -20721,13 +20457,6 @@
               </a:rPr>
               <a:t>End of part1.</a:t>
             </a:r>
-            <a:endParaRPr lang="en-US" sz="5500" dirty="0" smtClean="0">
-              <a:solidFill>
-                <a:schemeClr val="tx1"/>
-              </a:solidFill>
-              <a:ea typeface="ヒラギノ角ゴ Pro W3"/>
-              <a:cs typeface="ヒラギノ角ゴ Pro W3"/>
-            </a:endParaRPr>
           </a:p>
         </p:txBody>
       </p:sp>
@@ -24887,7 +24616,7 @@
         </p:nvSpPr>
         <p:spPr>
           <a:xfrm>
-            <a:off x="632194" y="843558"/>
+            <a:off x="632194" y="1190238"/>
             <a:ext cx="8476310" cy="2677656"/>
           </a:xfrm>
           <a:prstGeom prst="rect">
@@ -25344,7 +25073,7 @@
         </p:nvSpPr>
         <p:spPr>
           <a:xfrm>
-            <a:off x="632194" y="843558"/>
+            <a:off x="632194" y="1047383"/>
             <a:ext cx="8476310" cy="3108543"/>
           </a:xfrm>
           <a:prstGeom prst="rect">
@@ -25934,7 +25663,7 @@
         </p:nvSpPr>
         <p:spPr>
           <a:xfrm>
-            <a:off x="632194" y="1115908"/>
+            <a:off x="632194" y="1331932"/>
             <a:ext cx="8476310" cy="1815882"/>
           </a:xfrm>
           <a:prstGeom prst="rect">
@@ -39264,10 +38993,6 @@
               </a:rPr>
               <a:t>...</a:t>
             </a:r>
-            <a:endParaRPr lang="en-US" sz="1200" dirty="0" smtClean="0">
-              <a:latin typeface="Consolas" pitchFamily="49" charset="0"/>
-              <a:cs typeface="Consolas" pitchFamily="49" charset="0"/>
-            </a:endParaRPr>
           </a:p>
           <a:p>
             <a:pPr lvl="1">
@@ -39441,40 +39166,7 @@
                 <a:ea typeface="ヒラギノ角ゴ Pro W3" charset="0"/>
                 <a:cs typeface="Consolas" pitchFamily="49" charset="0"/>
               </a:rPr>
-              <a:t>Note: Full description can </a:t>
-            </a:r>
-            <a:r>
-              <a:rPr lang="en-US" sz="1400" i="1" dirty="0" smtClean="0">
-                <a:solidFill>
-                  <a:schemeClr val="bg2"/>
-                </a:solidFill>
-                <a:latin typeface="+mn-lt"/>
-                <a:ea typeface="ヒラギノ角ゴ Pro W3" charset="0"/>
-                <a:cs typeface="Consolas" pitchFamily="49" charset="0"/>
-              </a:rPr>
-              <a:t>be </a:t>
-            </a:r>
-            <a:r>
-              <a:rPr lang="en-US" sz="1400" i="1" dirty="0" smtClean="0">
-                <a:solidFill>
-                  <a:schemeClr val="bg2"/>
-                </a:solidFill>
-                <a:latin typeface="+mn-lt"/>
-                <a:ea typeface="ヒラギノ角ゴ Pro W3" charset="0"/>
-                <a:cs typeface="Consolas" pitchFamily="49" charset="0"/>
-              </a:rPr>
-              <a:t>found </a:t>
-            </a:r>
-            <a:r>
-              <a:rPr lang="en-US" sz="1400" i="1" dirty="0" smtClean="0">
-                <a:solidFill>
-                  <a:schemeClr val="bg2"/>
-                </a:solidFill>
-                <a:latin typeface="+mn-lt"/>
-                <a:ea typeface="ヒラギノ角ゴ Pro W3" charset="0"/>
-                <a:cs typeface="Consolas" pitchFamily="49" charset="0"/>
-              </a:rPr>
-              <a:t>here </a:t>
+              <a:t>Note: Full description can be found here </a:t>
             </a:r>
             <a:r>
               <a:rPr lang="en-US" sz="1400" i="1" dirty="0" smtClean="0">
@@ -39945,18 +39637,7 @@
                 <a:ea typeface="ヒラギノ角ゴ Pro W3" charset="0"/>
                 <a:cs typeface="Consolas" pitchFamily="49" charset="0"/>
               </a:rPr>
-              <a:t>// </a:t>
-            </a:r>
-            <a:r>
-              <a:rPr lang="en-US" sz="1400" dirty="0" smtClean="0">
-                <a:solidFill>
-                  <a:schemeClr val="bg2"/>
-                </a:solidFill>
-                <a:latin typeface="Consolas" pitchFamily="49" charset="0"/>
-                <a:ea typeface="ヒラギノ角ゴ Pro W3" charset="0"/>
-                <a:cs typeface="Consolas" pitchFamily="49" charset="0"/>
-              </a:rPr>
-              <a:t>main.cpp</a:t>
+              <a:t>// main.cpp</a:t>
             </a:r>
           </a:p>
           <a:p>
@@ -41397,7 +41078,7 @@
   <a:extraClrSchemeLst/>
   <a:extLst>
     <a:ext uri="{05A4C25C-085E-4340-85A3-A5531E510DB2}">
-      <thm15:themeFamily xmlns="" xmlns:thm15="http://schemas.microsoft.com/office/thememl/2012/main" name="Nokia PowerPoint Template Nokia Pure v12" id="{7AC05BEF-BBDF-4CF1-AA23-A676535EABCE}" vid="{991539CA-B441-4AED-8339-F6770207F6A2}"/>
+      <thm15:themeFamily xmlns:thm15="http://schemas.microsoft.com/office/thememl/2012/main" xmlns="" name="Nokia PowerPoint Template Nokia Pure v12" id="{7AC05BEF-BBDF-4CF1-AA23-A676535EABCE}" vid="{991539CA-B441-4AED-8339-F6770207F6A2}"/>
     </a:ext>
   </a:extLst>
 </a:theme>
@@ -41706,7 +41387,7 @@
   <a:extraClrSchemeLst/>
   <a:extLst>
     <a:ext uri="{05A4C25C-085E-4340-85A3-A5531E510DB2}">
-      <thm15:themeFamily xmlns="" xmlns:thm15="http://schemas.microsoft.com/office/thememl/2012/main" name="Nokia PowerPoint Template Nokia Pure v12" id="{7AC05BEF-BBDF-4CF1-AA23-A676535EABCE}" vid="{AF106B15-0C1E-44CE-A53A-F2CB8A6EA7E7}"/>
+      <thm15:themeFamily xmlns:thm15="http://schemas.microsoft.com/office/thememl/2012/main" xmlns="" name="Nokia PowerPoint Template Nokia Pure v12" id="{7AC05BEF-BBDF-4CF1-AA23-A676535EABCE}" vid="{AF106B15-0C1E-44CE-A53A-F2CB8A6EA7E7}"/>
     </a:ext>
   </a:extLst>
 </a:theme>

</xml_diff>

<commit_message>
Added slide with references.
</commit_message>
<xml_diff>
--- a/Diving into C++ linker.pptx
+++ b/Diving into C++ linker.pptx
@@ -7,10 +7,10 @@
     <p:sldMasterId id="2147483812" r:id="rId3"/>
   </p:sldMasterIdLst>
   <p:notesMasterIdLst>
-    <p:notesMasterId r:id="rId59"/>
+    <p:notesMasterId r:id="rId60"/>
   </p:notesMasterIdLst>
   <p:handoutMasterIdLst>
-    <p:handoutMasterId r:id="rId60"/>
+    <p:handoutMasterId r:id="rId61"/>
   </p:handoutMasterIdLst>
   <p:sldIdLst>
     <p:sldId id="311" r:id="rId4"/>
@@ -66,13 +66,14 @@
     <p:sldId id="417" r:id="rId54"/>
     <p:sldId id="418" r:id="rId55"/>
     <p:sldId id="382" r:id="rId56"/>
-    <p:sldId id="419" r:id="rId57"/>
-    <p:sldId id="364" r:id="rId58"/>
+    <p:sldId id="432" r:id="rId57"/>
+    <p:sldId id="419" r:id="rId58"/>
+    <p:sldId id="364" r:id="rId59"/>
   </p:sldIdLst>
   <p:sldSz cx="9144000" cy="5143500" type="screen16x9"/>
   <p:notesSz cx="6858000" cy="9144000"/>
   <p:custDataLst>
-    <p:tags r:id="rId61"/>
+    <p:tags r:id="rId62"/>
   </p:custDataLst>
   <p:defaultTextStyle>
     <a:defPPr>
@@ -343,7 +344,7 @@
               <a:pPr>
                 <a:defRPr/>
               </a:pPr>
-              <a:t>28-Jul-15</a:t>
+              <a:t>29-Jul-15</a:t>
             </a:fld>
             <a:endParaRPr lang="en-US"/>
           </a:p>
@@ -567,7 +568,7 @@
               <a:pPr>
                 <a:defRPr/>
               </a:pPr>
-              <a:t>28-Jul-15</a:t>
+              <a:t>29-Jul-15</a:t>
             </a:fld>
             <a:endParaRPr lang="en-US"/>
           </a:p>
@@ -1090,7 +1091,7 @@
               <a:pPr>
                 <a:defRPr/>
               </a:pPr>
-              <a:t>54</a:t>
+              <a:t>55</a:t>
             </a:fld>
             <a:endParaRPr lang="en-US"/>
           </a:p>
@@ -5353,7 +5354,7 @@
               <a:pPr>
                 <a:defRPr/>
               </a:pPr>
-              <a:t>28/07/2015</a:t>
+              <a:t>29/07/2015</a:t>
             </a:fld>
             <a:endParaRPr lang="en-GB" sz="800" dirty="0">
               <a:solidFill>
@@ -7558,7 +7559,7 @@
               <a:pPr>
                 <a:defRPr/>
               </a:pPr>
-              <a:t>28/07/2015</a:t>
+              <a:t>29/07/2015</a:t>
             </a:fld>
             <a:endParaRPr lang="en-GB" sz="800" dirty="0">
               <a:latin typeface="+mn-lt"/>
@@ -9344,7 +9345,7 @@
             <a:pPr algn="ctr"/>
             <a:r>
               <a:rPr lang="en-US" sz="3200" dirty="0" smtClean="0"/>
-              <a:t>Hereditary disease</a:t>
+              <a:t>Rules without enforcement</a:t>
             </a:r>
             <a:endParaRPr lang="en-US" sz="3200" dirty="0"/>
           </a:p>
@@ -10712,7 +10713,7 @@
             <a:pPr algn="ctr"/>
             <a:r>
               <a:rPr lang="en-US" sz="3200" dirty="0" smtClean="0"/>
-              <a:t>Hereditary disease</a:t>
+              <a:t>Rules without enforcement</a:t>
             </a:r>
             <a:endParaRPr lang="en-US" sz="3200" dirty="0"/>
           </a:p>
@@ -11233,7 +11234,7 @@
             <a:pPr algn="ctr"/>
             <a:r>
               <a:rPr lang="en-US" sz="3200" dirty="0" smtClean="0"/>
-              <a:t>Hereditary disease</a:t>
+              <a:t>Rules without enforcement</a:t>
             </a:r>
             <a:endParaRPr lang="en-US" sz="3200" dirty="0"/>
           </a:p>
@@ -12015,7 +12016,7 @@
             <a:pPr algn="ctr"/>
             <a:r>
               <a:rPr lang="en-US" sz="3200" dirty="0" smtClean="0"/>
-              <a:t>Hereditary disease</a:t>
+              <a:t>Rules without enforcement</a:t>
             </a:r>
             <a:endParaRPr lang="en-US" sz="3200" dirty="0"/>
           </a:p>
@@ -12813,7 +12814,7 @@
             <a:pPr algn="ctr"/>
             <a:r>
               <a:rPr lang="en-US" sz="3200" dirty="0" smtClean="0"/>
-              <a:t>Hereditary disease</a:t>
+              <a:t>Rules without enforcement</a:t>
             </a:r>
             <a:endParaRPr lang="en-US" sz="3200" dirty="0"/>
           </a:p>
@@ -13776,7 +13777,7 @@
             <a:pPr algn="ctr"/>
             <a:r>
               <a:rPr lang="en-US" sz="3200" dirty="0" smtClean="0"/>
-              <a:t>Hereditary disease</a:t>
+              <a:t>Rules without enforcement</a:t>
             </a:r>
             <a:endParaRPr lang="en-US" sz="3200" dirty="0"/>
           </a:p>
@@ -14702,7 +14703,7 @@
             <a:pPr algn="ctr"/>
             <a:r>
               <a:rPr lang="en-US" sz="3200" dirty="0" smtClean="0"/>
-              <a:t>Hereditary disease</a:t>
+              <a:t>Rules without enforcement</a:t>
             </a:r>
             <a:endParaRPr lang="en-US" sz="3200" dirty="0"/>
           </a:p>
@@ -29903,29 +29904,7 @@
                 <a:ea typeface="ヒラギノ角ゴ Pro W3" charset="0"/>
                 <a:cs typeface="Consolas" pitchFamily="49" charset="0"/>
               </a:rPr>
-              <a:t>$ </a:t>
-            </a:r>
-            <a:r>
-              <a:rPr lang="en-US" sz="1400" dirty="0" smtClean="0">
-                <a:solidFill>
-                  <a:schemeClr val="bg2"/>
-                </a:solidFill>
-                <a:latin typeface="Consolas" pitchFamily="49" charset="0"/>
-                <a:ea typeface="ヒラギノ角ゴ Pro W3" charset="0"/>
-                <a:cs typeface="Consolas" pitchFamily="49" charset="0"/>
-              </a:rPr>
-              <a:t>LD_LIBRARY_PATH = &lt;</a:t>
-            </a:r>
-            <a:r>
-              <a:rPr lang="en-US" sz="1400" dirty="0" smtClean="0">
-                <a:solidFill>
-                  <a:schemeClr val="bg2"/>
-                </a:solidFill>
-                <a:latin typeface="Consolas" pitchFamily="49" charset="0"/>
-                <a:ea typeface="ヒラギノ角ゴ Pro W3" charset="0"/>
-                <a:cs typeface="Consolas" pitchFamily="49" charset="0"/>
-              </a:rPr>
-              <a:t>path to </a:t>
+              <a:t>$ LD_LIBRARY_PATH = &lt;path to </a:t>
             </a:r>
             <a:r>
               <a:rPr lang="en-US" sz="1400" dirty="0" err="1" smtClean="0">
@@ -38241,6 +38220,470 @@
       </p:grpSpPr>
       <p:sp>
         <p:nvSpPr>
+          <p:cNvPr id="2" name="Title 1"/>
+          <p:cNvSpPr>
+            <a:spLocks noGrp="1"/>
+          </p:cNvSpPr>
+          <p:nvPr>
+            <p:ph type="title"/>
+          </p:nvPr>
+        </p:nvSpPr>
+        <p:spPr>
+          <a:xfrm>
+            <a:off x="416169" y="435143"/>
+            <a:ext cx="8229600" cy="480423"/>
+          </a:xfrm>
+        </p:spPr>
+        <p:txBody>
+          <a:bodyPr/>
+          <a:lstStyle/>
+          <a:p>
+            <a:pPr algn="ctr"/>
+            <a:r>
+              <a:rPr lang="en-US" sz="3200" dirty="0" smtClean="0"/>
+              <a:t>References</a:t>
+            </a:r>
+            <a:endParaRPr lang="en-US" sz="3200" dirty="0"/>
+          </a:p>
+        </p:txBody>
+      </p:sp>
+      <p:sp>
+        <p:nvSpPr>
+          <p:cNvPr id="3" name="Content Placeholder 2"/>
+          <p:cNvSpPr>
+            <a:spLocks noGrp="1"/>
+          </p:cNvSpPr>
+          <p:nvPr>
+            <p:ph sz="quarter" idx="13"/>
+          </p:nvPr>
+        </p:nvSpPr>
+        <p:spPr>
+          <a:xfrm>
+            <a:off x="418120" y="1203598"/>
+            <a:ext cx="8227649" cy="2952328"/>
+          </a:xfrm>
+        </p:spPr>
+        <p:txBody>
+          <a:bodyPr/>
+          <a:lstStyle/>
+          <a:p>
+            <a:pPr lvl="1">
+              <a:buNone/>
+            </a:pPr>
+            <a:r>
+              <a:rPr lang="en-US" sz="2400" dirty="0" smtClean="0"/>
+              <a:t> </a:t>
+            </a:r>
+          </a:p>
+        </p:txBody>
+      </p:sp>
+      <p:sp>
+        <p:nvSpPr>
+          <p:cNvPr id="6" name="Footer Placeholder 5"/>
+          <p:cNvSpPr>
+            <a:spLocks noGrp="1"/>
+          </p:cNvSpPr>
+          <p:nvPr>
+            <p:ph type="ftr" sz="quarter" idx="18"/>
+          </p:nvPr>
+        </p:nvSpPr>
+        <p:spPr/>
+        <p:txBody>
+          <a:bodyPr/>
+          <a:lstStyle/>
+          <a:p>
+            <a:pPr algn="l"/>
+            <a:r>
+              <a:rPr lang="en-GB" dirty="0" smtClean="0">
+                <a:solidFill>
+                  <a:schemeClr val="bg2"/>
+                </a:solidFill>
+                <a:cs typeface="Arial" charset="0"/>
+              </a:rPr>
+              <a:t>&lt;Change information classification in footer&gt;</a:t>
+            </a:r>
+          </a:p>
+        </p:txBody>
+      </p:sp>
+      <p:sp>
+        <p:nvSpPr>
+          <p:cNvPr id="5" name="Content Placeholder 2"/>
+          <p:cNvSpPr txBox="1">
+            <a:spLocks/>
+          </p:cNvSpPr>
+          <p:nvPr/>
+        </p:nvSpPr>
+        <p:spPr bwMode="auto">
+          <a:xfrm>
+            <a:off x="570520" y="1203598"/>
+            <a:ext cx="8227649" cy="2952328"/>
+          </a:xfrm>
+          <a:prstGeom prst="rect">
+            <a:avLst/>
+          </a:prstGeom>
+          <a:noFill/>
+          <a:ln w="9525">
+            <a:noFill/>
+            <a:miter lim="800000"/>
+            <a:headEnd/>
+            <a:tailEnd/>
+          </a:ln>
+        </p:spPr>
+        <p:txBody>
+          <a:bodyPr vert="horz" wrap="square" lIns="0" tIns="0" rIns="0" bIns="0" numCol="1" anchor="t" anchorCtr="0" compatLnSpc="1">
+            <a:prstTxWarp prst="textNoShape">
+              <a:avLst/>
+            </a:prstTxWarp>
+          </a:bodyPr>
+          <a:lstStyle/>
+          <a:p>
+            <a:pPr marL="458788" marR="0" lvl="1" indent="-228600" algn="l" defTabSz="457200" rtl="0" eaLnBrk="1" fontAlgn="base" latinLnBrk="0" hangingPunct="1">
+              <a:lnSpc>
+                <a:spcPct val="100000"/>
+              </a:lnSpc>
+              <a:spcBef>
+                <a:spcPct val="0"/>
+              </a:spcBef>
+              <a:spcAft>
+                <a:spcPts val="600"/>
+              </a:spcAft>
+              <a:buClrTx/>
+              <a:buSzTx/>
+              <a:buFont typeface="Arial" pitchFamily="34" charset="0"/>
+              <a:buChar char="•"/>
+              <a:tabLst/>
+              <a:defRPr/>
+            </a:pPr>
+            <a:endParaRPr kumimoji="0" lang="en-US" sz="2400" b="0" i="0" u="none" strike="noStrike" kern="1200" cap="none" spc="0" normalizeH="0" baseline="0" noProof="0" dirty="0" smtClean="0">
+              <a:ln>
+                <a:noFill/>
+              </a:ln>
+              <a:solidFill>
+                <a:schemeClr val="bg2"/>
+              </a:solidFill>
+              <a:effectLst/>
+              <a:uLnTx/>
+              <a:uFillTx/>
+              <a:latin typeface="+mn-lt"/>
+              <a:ea typeface="ヒラギノ角ゴ Pro W3" charset="0"/>
+              <a:cs typeface="ヒラギノ角ゴ Pro W3"/>
+            </a:endParaRPr>
+          </a:p>
+        </p:txBody>
+      </p:sp>
+      <p:sp>
+        <p:nvSpPr>
+          <p:cNvPr id="7" name="Rectangle 6"/>
+          <p:cNvSpPr/>
+          <p:nvPr/>
+        </p:nvSpPr>
+        <p:spPr>
+          <a:xfrm>
+            <a:off x="418120" y="1187336"/>
+            <a:ext cx="8553787" cy="1815882"/>
+          </a:xfrm>
+          <a:prstGeom prst="rect">
+            <a:avLst/>
+          </a:prstGeom>
+        </p:spPr>
+        <p:txBody>
+          <a:bodyPr wrap="square">
+            <a:spAutoFit/>
+          </a:bodyPr>
+          <a:lstStyle/>
+          <a:p>
+            <a:pPr marL="342900" indent="-342900" fontAlgn="t">
+              <a:buFontTx/>
+              <a:buAutoNum type="arabicPeriod"/>
+            </a:pPr>
+            <a:r>
+              <a:rPr lang="en-US" sz="1400" dirty="0" smtClean="0">
+                <a:solidFill>
+                  <a:srgbClr val="68717A"/>
+                </a:solidFill>
+                <a:latin typeface="Nokia Pure Headline Light"/>
+                <a:ea typeface="ヒラギノ角ゴ Pro W3" charset="0"/>
+                <a:cs typeface="ヒラギノ角ゴ Pro W3" charset="0"/>
+              </a:rPr>
+              <a:t>Sources for all examples that we covered you can find </a:t>
+            </a:r>
+            <a:r>
+              <a:rPr lang="en-US" sz="1400" dirty="0" smtClean="0">
+                <a:solidFill>
+                  <a:srgbClr val="68717A"/>
+                </a:solidFill>
+                <a:latin typeface="Nokia Pure Headline Light"/>
+                <a:ea typeface="ヒラギノ角ゴ Pro W3" charset="0"/>
+                <a:cs typeface="ヒラギノ角ゴ Pro W3" charset="0"/>
+              </a:rPr>
+              <a:t>under this link: </a:t>
+            </a:r>
+            <a:r>
+              <a:rPr lang="en-US" sz="1400" dirty="0" smtClean="0">
+                <a:solidFill>
+                  <a:srgbClr val="68717A"/>
+                </a:solidFill>
+                <a:latin typeface="Nokia Pure Headline Light"/>
+                <a:ea typeface="ヒラギノ角ゴ Pro W3" charset="0"/>
+                <a:cs typeface="ヒラギノ角ゴ Pro W3" charset="0"/>
+                <a:hlinkClick r:id="rId2"/>
+              </a:rPr>
+              <a:t>https://github.com/dendibakh/Linker</a:t>
+            </a:r>
+            <a:r>
+              <a:rPr lang="en-US" sz="1400" dirty="0" smtClean="0">
+                <a:solidFill>
+                  <a:srgbClr val="68717A"/>
+                </a:solidFill>
+                <a:latin typeface="Nokia Pure Headline Light"/>
+                <a:ea typeface="ヒラギノ角ゴ Pro W3" charset="0"/>
+                <a:cs typeface="ヒラギノ角ゴ Pro W3" charset="0"/>
+              </a:rPr>
+              <a:t>.</a:t>
+            </a:r>
+            <a:r>
+              <a:rPr lang="en-US" sz="1400" dirty="0" smtClean="0">
+                <a:solidFill>
+                  <a:srgbClr val="68717A"/>
+                </a:solidFill>
+                <a:latin typeface="Nokia Pure Headline Light"/>
+                <a:ea typeface="ヒラギノ角ゴ Pro W3" charset="0"/>
+                <a:cs typeface="ヒラギノ角ゴ Pro W3" charset="0"/>
+              </a:rPr>
+              <a:t/>
+            </a:r>
+            <a:br>
+              <a:rPr lang="en-US" sz="1400" dirty="0" smtClean="0">
+                <a:solidFill>
+                  <a:srgbClr val="68717A"/>
+                </a:solidFill>
+                <a:latin typeface="Nokia Pure Headline Light"/>
+                <a:ea typeface="ヒラギノ角ゴ Pro W3" charset="0"/>
+                <a:cs typeface="ヒラギノ角ゴ Pro W3" charset="0"/>
+              </a:rPr>
+            </a:br>
+            <a:endParaRPr lang="en-US" sz="1400" dirty="0" smtClean="0">
+              <a:solidFill>
+                <a:srgbClr val="68717A"/>
+              </a:solidFill>
+              <a:latin typeface="Nokia Pure Headline Light"/>
+              <a:ea typeface="ヒラギノ角ゴ Pro W3" charset="0"/>
+              <a:cs typeface="ヒラギノ角ゴ Pro W3" charset="0"/>
+            </a:endParaRPr>
+          </a:p>
+          <a:p>
+            <a:pPr marL="342900" indent="-342900" fontAlgn="t">
+              <a:buFontTx/>
+              <a:buAutoNum type="arabicPeriod"/>
+            </a:pPr>
+            <a:r>
+              <a:rPr lang="en-US" sz="1400" dirty="0" smtClean="0">
+                <a:solidFill>
+                  <a:srgbClr val="68717A"/>
+                </a:solidFill>
+                <a:latin typeface="Nokia Pure Headline Light"/>
+                <a:ea typeface="ヒラギノ角ゴ Pro W3" charset="0"/>
+                <a:cs typeface="ヒラギノ角ゴ Pro W3" charset="0"/>
+              </a:rPr>
+              <a:t>David </a:t>
+            </a:r>
+            <a:r>
+              <a:rPr lang="en-US" sz="1400" dirty="0" err="1" smtClean="0">
+                <a:solidFill>
+                  <a:srgbClr val="68717A"/>
+                </a:solidFill>
+                <a:latin typeface="Nokia Pure Headline Light"/>
+                <a:ea typeface="ヒラギノ角ゴ Pro W3" charset="0"/>
+                <a:cs typeface="ヒラギノ角ゴ Pro W3" charset="0"/>
+              </a:rPr>
+              <a:t>Drysdale</a:t>
+            </a:r>
+            <a:r>
+              <a:rPr lang="en-US" sz="1400" dirty="0" smtClean="0">
+                <a:solidFill>
+                  <a:srgbClr val="68717A"/>
+                </a:solidFill>
+                <a:latin typeface="Nokia Pure Headline Light"/>
+                <a:ea typeface="ヒラギノ角ゴ Pro W3" charset="0"/>
+                <a:cs typeface="ヒラギノ角ゴ Pro W3" charset="0"/>
+              </a:rPr>
+              <a:t>, Beginner's guide to linkers </a:t>
+            </a:r>
+            <a:r>
+              <a:rPr lang="en-US" sz="1400" dirty="0" smtClean="0">
+                <a:solidFill>
+                  <a:srgbClr val="68717A"/>
+                </a:solidFill>
+                <a:latin typeface="Nokia Pure Headline Light"/>
+                <a:ea typeface="ヒラギノ角ゴ Pro W3" charset="0"/>
+                <a:cs typeface="ヒラギノ角ゴ Pro W3" charset="0"/>
+              </a:rPr>
+              <a:t> (</a:t>
+            </a:r>
+            <a:r>
+              <a:rPr lang="en-US" sz="1400" dirty="0" smtClean="0">
+                <a:solidFill>
+                  <a:srgbClr val="68717A"/>
+                </a:solidFill>
+                <a:latin typeface="Nokia Pure Headline Light"/>
+                <a:ea typeface="ヒラギノ角ゴ Pro W3" charset="0"/>
+                <a:cs typeface="ヒラギノ角ゴ Pro W3" charset="0"/>
+                <a:hlinkClick r:id="rId3"/>
+              </a:rPr>
+              <a:t>http</a:t>
+            </a:r>
+            <a:r>
+              <a:rPr lang="en-US" sz="1400" dirty="0" smtClean="0">
+                <a:solidFill>
+                  <a:srgbClr val="68717A"/>
+                </a:solidFill>
+                <a:latin typeface="Nokia Pure Headline Light"/>
+                <a:ea typeface="ヒラギノ角ゴ Pro W3" charset="0"/>
+                <a:cs typeface="ヒラギノ角ゴ Pro W3" charset="0"/>
+                <a:hlinkClick r:id="rId3"/>
+              </a:rPr>
+              <a:t>://</a:t>
+            </a:r>
+            <a:r>
+              <a:rPr lang="en-US" sz="1400" dirty="0" smtClean="0">
+                <a:solidFill>
+                  <a:srgbClr val="68717A"/>
+                </a:solidFill>
+                <a:latin typeface="Nokia Pure Headline Light"/>
+                <a:ea typeface="ヒラギノ角ゴ Pro W3" charset="0"/>
+                <a:cs typeface="ヒラギノ角ゴ Pro W3" charset="0"/>
+                <a:hlinkClick r:id="rId3"/>
+              </a:rPr>
+              <a:t>www.lurklurk.org/linkers/linkers.html</a:t>
+            </a:r>
+            <a:r>
+              <a:rPr lang="en-US" sz="1400" dirty="0" smtClean="0">
+                <a:solidFill>
+                  <a:srgbClr val="68717A"/>
+                </a:solidFill>
+                <a:latin typeface="Nokia Pure Headline Light"/>
+                <a:ea typeface="ヒラギノ角ゴ Pro W3" charset="0"/>
+                <a:cs typeface="ヒラギノ角ゴ Pro W3" charset="0"/>
+              </a:rPr>
+              <a:t>).</a:t>
+            </a:r>
+            <a:endParaRPr lang="en-US" sz="1400" dirty="0" smtClean="0">
+              <a:solidFill>
+                <a:srgbClr val="68717A"/>
+              </a:solidFill>
+              <a:latin typeface="Nokia Pure Headline Light"/>
+              <a:ea typeface="ヒラギノ角ゴ Pro W3" charset="0"/>
+              <a:cs typeface="ヒラギノ角ゴ Pro W3" charset="0"/>
+            </a:endParaRPr>
+          </a:p>
+          <a:p>
+            <a:pPr marL="342900" indent="-342900" fontAlgn="t">
+              <a:buAutoNum type="arabicPeriod"/>
+            </a:pPr>
+            <a:endParaRPr lang="en-US" sz="1400" dirty="0" smtClean="0">
+              <a:solidFill>
+                <a:srgbClr val="68717A"/>
+              </a:solidFill>
+              <a:latin typeface="Nokia Pure Headline Light"/>
+              <a:ea typeface="ヒラギノ角ゴ Pro W3" charset="0"/>
+              <a:cs typeface="ヒラギノ角ゴ Pro W3" charset="0"/>
+            </a:endParaRPr>
+          </a:p>
+          <a:p>
+            <a:pPr marL="342900" indent="-342900" fontAlgn="t">
+              <a:buAutoNum type="arabicPeriod"/>
+            </a:pPr>
+            <a:r>
+              <a:rPr lang="en-US" sz="1400" dirty="0" smtClean="0">
+                <a:solidFill>
+                  <a:srgbClr val="68717A"/>
+                </a:solidFill>
+                <a:latin typeface="Nokia Pure Headline Light"/>
+                <a:ea typeface="ヒラギノ角ゴ Pro W3" charset="0"/>
+                <a:cs typeface="ヒラギノ角ゴ Pro W3" charset="0"/>
+                <a:hlinkClick r:id="rId4"/>
+              </a:rPr>
+              <a:t>https://sourceware.org/binutils/docs/binutils</a:t>
+            </a:r>
+            <a:r>
+              <a:rPr lang="en-US" sz="1400" dirty="0" smtClean="0">
+                <a:solidFill>
+                  <a:srgbClr val="68717A"/>
+                </a:solidFill>
+                <a:latin typeface="Nokia Pure Headline Light"/>
+                <a:ea typeface="ヒラギノ角ゴ Pro W3" charset="0"/>
+                <a:cs typeface="ヒラギノ角ゴ Pro W3" charset="0"/>
+              </a:rPr>
+              <a:t>.</a:t>
+            </a:r>
+          </a:p>
+          <a:p>
+            <a:pPr marL="342900" indent="-342900" fontAlgn="t">
+              <a:buAutoNum type="arabicPeriod"/>
+            </a:pPr>
+            <a:endParaRPr lang="en-US" sz="1400" dirty="0" smtClean="0">
+              <a:solidFill>
+                <a:srgbClr val="68717A"/>
+              </a:solidFill>
+              <a:latin typeface="Nokia Pure Headline Light"/>
+              <a:ea typeface="ヒラギノ角ゴ Pro W3" charset="0"/>
+              <a:cs typeface="ヒラギノ角ゴ Pro W3" charset="0"/>
+            </a:endParaRPr>
+          </a:p>
+          <a:p>
+            <a:pPr marL="342900" indent="-342900" fontAlgn="t">
+              <a:buAutoNum type="arabicPeriod"/>
+            </a:pPr>
+            <a:r>
+              <a:rPr lang="en-US" sz="1400" dirty="0" smtClean="0">
+                <a:solidFill>
+                  <a:srgbClr val="68717A"/>
+                </a:solidFill>
+                <a:latin typeface="Nokia Pure Headline Light"/>
+                <a:ea typeface="ヒラギノ角ゴ Pro W3" charset="0"/>
+                <a:cs typeface="ヒラギノ角ゴ Pro W3" charset="0"/>
+                <a:hlinkClick r:id="rId5"/>
+              </a:rPr>
+              <a:t>http://stackoverflow.com/questions/31495877/i-receive-different-results-on-unix-and-win-when-use-static-members-with-static</a:t>
+            </a:r>
+            <a:endParaRPr lang="en-US" sz="1400" dirty="0" smtClean="0">
+              <a:solidFill>
+                <a:srgbClr val="68717A"/>
+              </a:solidFill>
+              <a:latin typeface="Nokia Pure Headline Light"/>
+              <a:ea typeface="ヒラギノ角ゴ Pro W3" charset="0"/>
+              <a:cs typeface="ヒラギノ角ゴ Pro W3" charset="0"/>
+            </a:endParaRPr>
+          </a:p>
+        </p:txBody>
+      </p:sp>
+    </p:spTree>
+  </p:cSld>
+  <p:clrMapOvr>
+    <a:masterClrMapping/>
+  </p:clrMapOvr>
+</p:sld>
+</file>
+
+<file path=ppt/slides/slide55.xml><?xml version="1.0" encoding="utf-8"?>
+<p:sld xmlns:a="http://schemas.openxmlformats.org/drawingml/2006/main" xmlns:r="http://schemas.openxmlformats.org/officeDocument/2006/relationships" xmlns:p="http://schemas.openxmlformats.org/presentationml/2006/main">
+  <p:cSld>
+    <p:spTree>
+      <p:nvGrpSpPr>
+        <p:cNvPr id="1" name=""/>
+        <p:cNvGrpSpPr/>
+        <p:nvPr/>
+      </p:nvGrpSpPr>
+      <p:grpSpPr>
+        <a:xfrm>
+          <a:off x="0" y="0"/>
+          <a:ext cx="0" cy="0"/>
+          <a:chOff x="0" y="0"/>
+          <a:chExt cx="0" cy="0"/>
+        </a:xfrm>
+      </p:grpSpPr>
+      <p:sp>
+        <p:nvSpPr>
           <p:cNvPr id="13313" name="Text Placeholder 5"/>
           <p:cNvSpPr>
             <a:spLocks noGrp="1"/>
@@ -38371,7 +38814,7 @@
 </p:sld>
 </file>
 
-<file path=ppt/slides/slide55.xml><?xml version="1.0" encoding="utf-8"?>
+<file path=ppt/slides/slide56.xml><?xml version="1.0" encoding="utf-8"?>
 <p:sld xmlns:a="http://schemas.openxmlformats.org/drawingml/2006/main" xmlns:r="http://schemas.openxmlformats.org/officeDocument/2006/relationships" xmlns:p="http://schemas.openxmlformats.org/presentationml/2006/main" show="0">
   <p:cSld>
     <p:spTree>

</xml_diff>

<commit_message>
Added second version of the presentation
- Added slides for LTR and PIC concepts
- Remove slide with preferable structure
- Some minor improvements
</commit_message>
<xml_diff>
--- a/Diving into C++ linker.pptx
+++ b/Diving into C++ linker.pptx
@@ -202,7 +202,7 @@
   </p:defaultTextStyle>
   <p:extLst>
     <p:ext uri="{EFAFB233-063F-42B5-8137-9DF3F51BA10A}">
-      <p15:sldGuideLst xmlns="" xmlns:p15="http://schemas.microsoft.com/office/powerpoint/2012/main">
+      <p15:sldGuideLst xmlns:p15="http://schemas.microsoft.com/office/powerpoint/2012/main">
         <p15:guide id="1" orient="horz" pos="1620">
           <p15:clr>
             <a:srgbClr val="A4A3A4"/>
@@ -216,7 +216,7 @@
       </p15:sldGuideLst>
     </p:ext>
     <p:ext uri="{2D200454-40CA-4A62-9FC3-DE9A4176ACB9}">
-      <p15:notesGuideLst xmlns="" xmlns:p15="http://schemas.microsoft.com/office/powerpoint/2012/main">
+      <p15:notesGuideLst xmlns:p15="http://schemas.microsoft.com/office/powerpoint/2012/main">
         <p15:guide id="1" orient="horz" pos="2880">
           <p15:clr>
             <a:srgbClr val="A4A3A4"/>
@@ -344,7 +344,7 @@
               <a:pPr>
                 <a:defRPr/>
               </a:pPr>
-              <a:t>29-Jul-15</a:t>
+              <a:t>21-Oct-15</a:t>
             </a:fld>
             <a:endParaRPr lang="en-US"/>
           </a:p>
@@ -448,7 +448,7 @@
     </p:spTree>
     <p:extLst>
       <p:ext uri="{BB962C8B-B14F-4D97-AF65-F5344CB8AC3E}">
-        <p14:creationId xmlns="" xmlns:p14="http://schemas.microsoft.com/office/powerpoint/2010/main" val="3867598621"/>
+        <p14:creationId xmlns:p14="http://schemas.microsoft.com/office/powerpoint/2010/main" val="3867598621"/>
       </p:ext>
     </p:extLst>
   </p:cSld>
@@ -568,7 +568,7 @@
               <a:pPr>
                 <a:defRPr/>
               </a:pPr>
-              <a:t>29-Jul-15</a:t>
+              <a:t>21-Oct-15</a:t>
             </a:fld>
             <a:endParaRPr lang="en-US"/>
           </a:p>
@@ -769,7 +769,7 @@
     </p:spTree>
     <p:extLst>
       <p:ext uri="{BB962C8B-B14F-4D97-AF65-F5344CB8AC3E}">
-        <p14:creationId xmlns="" xmlns:p14="http://schemas.microsoft.com/office/powerpoint/2010/main" val="977992471"/>
+        <p14:creationId xmlns:p14="http://schemas.microsoft.com/office/powerpoint/2010/main" val="977992471"/>
       </p:ext>
     </p:extLst>
   </p:cSld>
@@ -995,7 +995,7 @@
     </p:spTree>
     <p:extLst>
       <p:ext uri="{BB962C8B-B14F-4D97-AF65-F5344CB8AC3E}">
-        <p14:creationId xmlns="" xmlns:p14="http://schemas.microsoft.com/office/powerpoint/2010/main" val="3180054805"/>
+        <p14:creationId xmlns:p14="http://schemas.microsoft.com/office/powerpoint/2010/main" val="3180054805"/>
       </p:ext>
     </p:extLst>
   </p:cSld>
@@ -1100,7 +1100,7 @@
     </p:spTree>
     <p:extLst>
       <p:ext uri="{BB962C8B-B14F-4D97-AF65-F5344CB8AC3E}">
-        <p14:creationId xmlns="" xmlns:p14="http://schemas.microsoft.com/office/powerpoint/2010/main" val="3180054805"/>
+        <p14:creationId xmlns:p14="http://schemas.microsoft.com/office/powerpoint/2010/main" val="3180054805"/>
       </p:ext>
     </p:extLst>
   </p:cSld>
@@ -1190,6 +1190,11 @@
         </p:txBody>
       </p:sp>
     </p:spTree>
+    <p:extLst>
+      <p:ext uri="{BB962C8B-B14F-4D97-AF65-F5344CB8AC3E}">
+        <p14:creationId xmlns:p14="http://schemas.microsoft.com/office/powerpoint/2010/main" val="366301519"/>
+      </p:ext>
+    </p:extLst>
   </p:cSld>
   <p:clrMapOvr>
     <a:masterClrMapping/>
@@ -1277,6 +1282,11 @@
         </p:txBody>
       </p:sp>
     </p:spTree>
+    <p:extLst>
+      <p:ext uri="{BB962C8B-B14F-4D97-AF65-F5344CB8AC3E}">
+        <p14:creationId xmlns:p14="http://schemas.microsoft.com/office/powerpoint/2010/main" val="1095651687"/>
+      </p:ext>
+    </p:extLst>
   </p:cSld>
   <p:clrMapOvr>
     <a:masterClrMapping/>
@@ -1379,7 +1389,7 @@
     </p:spTree>
     <p:extLst>
       <p:ext uri="{BB962C8B-B14F-4D97-AF65-F5344CB8AC3E}">
-        <p14:creationId xmlns="" xmlns:p14="http://schemas.microsoft.com/office/powerpoint/2010/main" val="3180054805"/>
+        <p14:creationId xmlns:p14="http://schemas.microsoft.com/office/powerpoint/2010/main" val="3180054805"/>
       </p:ext>
     </p:extLst>
   </p:cSld>
@@ -1469,6 +1479,11 @@
         </p:txBody>
       </p:sp>
     </p:spTree>
+    <p:extLst>
+      <p:ext uri="{BB962C8B-B14F-4D97-AF65-F5344CB8AC3E}">
+        <p14:creationId xmlns:p14="http://schemas.microsoft.com/office/powerpoint/2010/main" val="865917852"/>
+      </p:ext>
+    </p:extLst>
   </p:cSld>
   <p:clrMapOvr>
     <a:masterClrMapping/>
@@ -1556,6 +1571,11 @@
         </p:txBody>
       </p:sp>
     </p:spTree>
+    <p:extLst>
+      <p:ext uri="{BB962C8B-B14F-4D97-AF65-F5344CB8AC3E}">
+        <p14:creationId xmlns:p14="http://schemas.microsoft.com/office/powerpoint/2010/main" val="4019969800"/>
+      </p:ext>
+    </p:extLst>
   </p:cSld>
   <p:clrMapOvr>
     <a:masterClrMapping/>
@@ -1643,6 +1663,11 @@
         </p:txBody>
       </p:sp>
     </p:spTree>
+    <p:extLst>
+      <p:ext uri="{BB962C8B-B14F-4D97-AF65-F5344CB8AC3E}">
+        <p14:creationId xmlns:p14="http://schemas.microsoft.com/office/powerpoint/2010/main" val="212770868"/>
+      </p:ext>
+    </p:extLst>
   </p:cSld>
   <p:clrMapOvr>
     <a:masterClrMapping/>
@@ -1730,6 +1755,11 @@
         </p:txBody>
       </p:sp>
     </p:spTree>
+    <p:extLst>
+      <p:ext uri="{BB962C8B-B14F-4D97-AF65-F5344CB8AC3E}">
+        <p14:creationId xmlns:p14="http://schemas.microsoft.com/office/powerpoint/2010/main" val="735278785"/>
+      </p:ext>
+    </p:extLst>
   </p:cSld>
   <p:clrMapOvr>
     <a:masterClrMapping/>
@@ -1825,6 +1855,11 @@
         </p:txBody>
       </p:sp>
     </p:spTree>
+    <p:extLst>
+      <p:ext uri="{BB962C8B-B14F-4D97-AF65-F5344CB8AC3E}">
+        <p14:creationId xmlns:p14="http://schemas.microsoft.com/office/powerpoint/2010/main" val="338756043"/>
+      </p:ext>
+    </p:extLst>
   </p:cSld>
   <p:clrMapOvr>
     <a:masterClrMapping/>
@@ -2845,7 +2880,7 @@
           <a:blip r:embed="rId3">
             <a:extLst>
               <a:ext uri="{28A0092B-C50C-407E-A947-70E740481C1C}">
-                <a14:useLocalDpi xmlns:a14="http://schemas.microsoft.com/office/drawing/2010/main" xmlns="" val="0"/>
+                <a14:useLocalDpi xmlns:a14="http://schemas.microsoft.com/office/drawing/2010/main" val="0"/>
               </a:ext>
             </a:extLst>
           </a:blip>
@@ -3063,7 +3098,7 @@
           <a:blip r:embed="rId3">
             <a:extLst>
               <a:ext uri="{28A0092B-C50C-407E-A947-70E740481C1C}">
-                <a14:useLocalDpi xmlns:a14="http://schemas.microsoft.com/office/drawing/2010/main" xmlns="" val="0"/>
+                <a14:useLocalDpi xmlns:a14="http://schemas.microsoft.com/office/drawing/2010/main" val="0"/>
               </a:ext>
             </a:extLst>
           </a:blip>
@@ -3515,7 +3550,11 @@
           <p:cNvGraphicFramePr>
             <a:graphicFrameLocks noChangeAspect="1"/>
           </p:cNvGraphicFramePr>
-          <p:nvPr/>
+          <p:nvPr>
+            <p:custDataLst>
+              <p:tags r:id="rId8"/>
+            </p:custDataLst>
+          </p:nvPr>
         </p:nvGraphicFramePr>
         <p:xfrm>
           <a:off x="1587" y="1588"/>
@@ -3523,9 +3562,59 @@
         </p:xfrm>
         <a:graphic>
           <a:graphicData uri="http://schemas.openxmlformats.org/presentationml/2006/ole">
-            <p:oleObj spid="_x0000_s2050" name="think-cell Slide" r:id="rId8" imgW="360" imgH="360" progId="">
-              <p:embed/>
-            </p:oleObj>
+            <mc:AlternateContent xmlns:mc="http://schemas.openxmlformats.org/markup-compatibility/2006">
+              <mc:Choice xmlns:v="urn:schemas-microsoft-com:vml" Requires="v">
+                <p:oleObj spid="_x0000_s2052" name="think-cell Slide" r:id="rId9" imgW="360" imgH="360" progId="">
+                  <p:embed/>
+                </p:oleObj>
+              </mc:Choice>
+              <mc:Fallback>
+                <p:oleObj name="think-cell Slide" r:id="rId9" imgW="360" imgH="360" progId="">
+                  <p:embed/>
+                  <p:pic>
+                    <p:nvPicPr>
+                      <p:cNvPr id="0" name="Picture 2" hidden="1"/>
+                      <p:cNvPicPr>
+                        <a:picLocks noChangeAspect="1" noChangeArrowheads="1"/>
+                      </p:cNvPicPr>
+                      <p:nvPr/>
+                    </p:nvPicPr>
+                    <p:blipFill>
+                      <a:blip r:embed="rId10">
+                        <a:extLst>
+                          <a:ext uri="{28A0092B-C50C-407E-A947-70E740481C1C}">
+                            <a14:useLocalDpi xmlns:a14="http://schemas.microsoft.com/office/drawing/2010/main" val="0"/>
+                          </a:ext>
+                        </a:extLst>
+                      </a:blip>
+                      <a:srcRect/>
+                      <a:stretch>
+                        <a:fillRect/>
+                      </a:stretch>
+                    </p:blipFill>
+                    <p:spPr bwMode="auto">
+                      <a:xfrm>
+                        <a:off x="1587" y="1588"/>
+                        <a:ext cx="1587" cy="1587"/>
+                      </a:xfrm>
+                      <a:prstGeom prst="rect">
+                        <a:avLst/>
+                      </a:prstGeom>
+                      <a:noFill/>
+                      <a:extLst>
+                        <a:ext uri="{909E8E84-426E-40DD-AFC4-6F175D3DCCD1}">
+                          <a14:hiddenFill xmlns:a14="http://schemas.microsoft.com/office/drawing/2010/main">
+                            <a:solidFill>
+                              <a:srgbClr val="FFFFFF"/>
+                            </a:solidFill>
+                          </a14:hiddenFill>
+                        </a:ext>
+                      </a:extLst>
+                    </p:spPr>
+                  </p:pic>
+                </p:oleObj>
+              </mc:Fallback>
+            </mc:AlternateContent>
           </a:graphicData>
         </a:graphic>
       </p:graphicFrame>
@@ -5005,7 +5094,7 @@
           <p:nvPr/>
         </p:nvPicPr>
         <p:blipFill>
-          <a:blip r:embed="rId9"/>
+          <a:blip r:embed="rId11"/>
           <a:srcRect/>
           <a:stretch>
             <a:fillRect/>
@@ -5354,7 +5443,7 @@
               <a:pPr>
                 <a:defRPr/>
               </a:pPr>
-              <a:t>29/07/2015</a:t>
+              <a:t>21/10/2015</a:t>
             </a:fld>
             <a:endParaRPr lang="en-GB" sz="800" dirty="0">
               <a:solidFill>
@@ -7559,7 +7648,7 @@
               <a:pPr>
                 <a:defRPr/>
               </a:pPr>
-              <a:t>29/07/2015</a:t>
+              <a:t>21/10/2015</a:t>
             </a:fld>
             <a:endParaRPr lang="en-GB" sz="800" dirty="0">
               <a:latin typeface="+mn-lt"/>
@@ -9302,6 +9391,13 @@
   <p:clrMapOvr>
     <a:masterClrMapping/>
   </p:clrMapOvr>
+  <p:timing>
+    <p:tnLst>
+      <p:par>
+        <p:cTn id="1" dur="indefinite" restart="never" nodeType="tmRoot"/>
+      </p:par>
+    </p:tnLst>
+  </p:timing>
 </p:sld>
 </file>
 
@@ -10670,6 +10766,13 @@
   <p:clrMapOvr>
     <a:masterClrMapping/>
   </p:clrMapOvr>
+  <p:timing>
+    <p:tnLst>
+      <p:par>
+        <p:cTn id="1" dur="indefinite" restart="never" nodeType="tmRoot"/>
+      </p:par>
+    </p:tnLst>
+  </p:timing>
 </p:sld>
 </file>
 
@@ -11191,6 +11294,13 @@
   <p:clrMapOvr>
     <a:masterClrMapping/>
   </p:clrMapOvr>
+  <p:timing>
+    <p:tnLst>
+      <p:par>
+        <p:cTn id="1" dur="indefinite" restart="never" nodeType="tmRoot"/>
+      </p:par>
+    </p:tnLst>
+  </p:timing>
 </p:sld>
 </file>
 
@@ -11973,6 +12083,13 @@
   <p:clrMapOvr>
     <a:masterClrMapping/>
   </p:clrMapOvr>
+  <p:timing>
+    <p:tnLst>
+      <p:par>
+        <p:cTn id="1" dur="indefinite" restart="never" nodeType="tmRoot"/>
+      </p:par>
+    </p:tnLst>
+  </p:timing>
 </p:sld>
 </file>
 
@@ -12771,6 +12888,13 @@
   <p:clrMapOvr>
     <a:masterClrMapping/>
   </p:clrMapOvr>
+  <p:timing>
+    <p:tnLst>
+      <p:par>
+        <p:cTn id="1" dur="indefinite" restart="never" nodeType="tmRoot"/>
+      </p:par>
+    </p:tnLst>
+  </p:timing>
 </p:sld>
 </file>
 
@@ -13734,6 +13858,13 @@
   <p:clrMapOvr>
     <a:masterClrMapping/>
   </p:clrMapOvr>
+  <p:timing>
+    <p:tnLst>
+      <p:par>
+        <p:cTn id="1" dur="indefinite" restart="never" nodeType="tmRoot"/>
+      </p:par>
+    </p:tnLst>
+  </p:timing>
 </p:sld>
 </file>
 
@@ -14660,6 +14791,13 @@
   <p:clrMapOvr>
     <a:masterClrMapping/>
   </p:clrMapOvr>
+  <p:timing>
+    <p:tnLst>
+      <p:par>
+        <p:cTn id="1" dur="indefinite" restart="never" nodeType="tmRoot"/>
+      </p:par>
+    </p:tnLst>
+  </p:timing>
 </p:sld>
 </file>
 
@@ -15021,6 +15159,13 @@
   <p:clrMapOvr>
     <a:masterClrMapping/>
   </p:clrMapOvr>
+  <p:timing>
+    <p:tnLst>
+      <p:par>
+        <p:cTn id="1" dur="indefinite" restart="never" nodeType="tmRoot"/>
+      </p:par>
+    </p:tnLst>
+  </p:timing>
 </p:sld>
 </file>
 
@@ -15299,6 +15444,13 @@
   <p:clrMapOvr>
     <a:masterClrMapping/>
   </p:clrMapOvr>
+  <p:timing>
+    <p:tnLst>
+      <p:par>
+        <p:cTn id="1" dur="indefinite" restart="never" nodeType="tmRoot"/>
+      </p:par>
+    </p:tnLst>
+  </p:timing>
 </p:sld>
 </file>
 
@@ -15577,6 +15729,13 @@
   <p:clrMapOvr>
     <a:masterClrMapping/>
   </p:clrMapOvr>
+  <p:timing>
+    <p:tnLst>
+      <p:par>
+        <p:cTn id="1" dur="indefinite" restart="never" nodeType="tmRoot"/>
+      </p:par>
+    </p:tnLst>
+  </p:timing>
 </p:sld>
 </file>
 
@@ -15791,6 +15950,13 @@
   <p:clrMapOvr>
     <a:masterClrMapping/>
   </p:clrMapOvr>
+  <p:timing>
+    <p:tnLst>
+      <p:par>
+        <p:cTn id="1" dur="indefinite" restart="never" nodeType="tmRoot"/>
+      </p:par>
+    </p:tnLst>
+  </p:timing>
 </p:sld>
 </file>
 
@@ -16483,6 +16649,13 @@
   <p:clrMapOvr>
     <a:masterClrMapping/>
   </p:clrMapOvr>
+  <p:timing>
+    <p:tnLst>
+      <p:par>
+        <p:cTn id="1" dur="indefinite" restart="never" nodeType="tmRoot"/>
+      </p:par>
+    </p:tnLst>
+  </p:timing>
 </p:sld>
 </file>
 
@@ -20407,6 +20580,13 @@
   <p:clrMapOvr>
     <a:masterClrMapping/>
   </p:clrMapOvr>
+  <p:timing>
+    <p:tnLst>
+      <p:par>
+        <p:cTn id="1" dur="indefinite" restart="never" nodeType="tmRoot"/>
+      </p:par>
+    </p:tnLst>
+  </p:timing>
 </p:sld>
 </file>
 
@@ -21016,6 +21196,13 @@
   <p:clrMapOvr>
     <a:masterClrMapping/>
   </p:clrMapOvr>
+  <p:timing>
+    <p:tnLst>
+      <p:par>
+        <p:cTn id="1" dur="indefinite" restart="never" nodeType="tmRoot"/>
+      </p:par>
+    </p:tnLst>
+  </p:timing>
 </p:sld>
 </file>
 
@@ -22332,6 +22519,13 @@
   <p:clrMapOvr>
     <a:masterClrMapping/>
   </p:clrMapOvr>
+  <p:timing>
+    <p:tnLst>
+      <p:par>
+        <p:cTn id="1" dur="indefinite" restart="never" nodeType="tmRoot"/>
+      </p:par>
+    </p:tnLst>
+  </p:timing>
 </p:sld>
 </file>
 
@@ -24436,6 +24630,13 @@
   <p:clrMapOvr>
     <a:masterClrMapping/>
   </p:clrMapOvr>
+  <p:timing>
+    <p:tnLst>
+      <p:par>
+        <p:cTn id="1" dur="indefinite" restart="never" nodeType="tmRoot"/>
+      </p:par>
+    </p:tnLst>
+  </p:timing>
 </p:sld>
 </file>
 
@@ -24893,6 +25094,13 @@
   <p:clrMapOvr>
     <a:masterClrMapping/>
   </p:clrMapOvr>
+  <p:timing>
+    <p:tnLst>
+      <p:par>
+        <p:cTn id="1" dur="indefinite" restart="never" nodeType="tmRoot"/>
+      </p:par>
+    </p:tnLst>
+  </p:timing>
 </p:sld>
 </file>
 
@@ -25483,6 +25691,13 @@
   <p:clrMapOvr>
     <a:masterClrMapping/>
   </p:clrMapOvr>
+  <p:timing>
+    <p:tnLst>
+      <p:par>
+        <p:cTn id="1" dur="indefinite" restart="never" nodeType="tmRoot"/>
+      </p:par>
+    </p:tnLst>
+  </p:timing>
 </p:sld>
 </file>
 
@@ -27336,6 +27551,13 @@
   <p:clrMapOvr>
     <a:masterClrMapping/>
   </p:clrMapOvr>
+  <p:timing>
+    <p:tnLst>
+      <p:par>
+        <p:cTn id="1" dur="indefinite" restart="never" nodeType="tmRoot"/>
+      </p:par>
+    </p:tnLst>
+  </p:timing>
 </p:sld>
 </file>
 
@@ -28001,6 +28223,13 @@
   <p:clrMapOvr>
     <a:masterClrMapping/>
   </p:clrMapOvr>
+  <p:timing>
+    <p:tnLst>
+      <p:par>
+        <p:cTn id="1" dur="indefinite" restart="never" nodeType="tmRoot"/>
+      </p:par>
+    </p:tnLst>
+  </p:timing>
 </p:sld>
 </file>
 
@@ -30314,6 +30543,13 @@
   <p:clrMapOvr>
     <a:masterClrMapping/>
   </p:clrMapOvr>
+  <p:timing>
+    <p:tnLst>
+      <p:par>
+        <p:cTn id="1" dur="indefinite" restart="never" nodeType="tmRoot"/>
+      </p:par>
+    </p:tnLst>
+  </p:timing>
 </p:sld>
 </file>
 
@@ -30945,6 +31181,13 @@
   <p:clrMapOvr>
     <a:masterClrMapping/>
   </p:clrMapOvr>
+  <p:timing>
+    <p:tnLst>
+      <p:par>
+        <p:cTn id="1" dur="indefinite" restart="never" nodeType="tmRoot"/>
+      </p:par>
+    </p:tnLst>
+  </p:timing>
 </p:sld>
 </file>
 
@@ -31553,6 +31796,13 @@
   <p:clrMapOvr>
     <a:masterClrMapping/>
   </p:clrMapOvr>
+  <p:timing>
+    <p:tnLst>
+      <p:par>
+        <p:cTn id="1" dur="indefinite" restart="never" nodeType="tmRoot"/>
+      </p:par>
+    </p:tnLst>
+  </p:timing>
 </p:sld>
 </file>
 
@@ -32302,6 +32552,13 @@
   <p:clrMapOvr>
     <a:masterClrMapping/>
   </p:clrMapOvr>
+  <p:timing>
+    <p:tnLst>
+      <p:par>
+        <p:cTn id="1" dur="indefinite" restart="never" nodeType="tmRoot"/>
+      </p:par>
+    </p:tnLst>
+  </p:timing>
 </p:sld>
 </file>
 
@@ -33197,6 +33454,13 @@
   <p:clrMapOvr>
     <a:masterClrMapping/>
   </p:clrMapOvr>
+  <p:timing>
+    <p:tnLst>
+      <p:par>
+        <p:cTn id="1" dur="indefinite" restart="never" nodeType="tmRoot"/>
+      </p:par>
+    </p:tnLst>
+  </p:timing>
 </p:sld>
 </file>
 
@@ -33401,6 +33665,13 @@
   <p:clrMapOvr>
     <a:masterClrMapping/>
   </p:clrMapOvr>
+  <p:timing>
+    <p:tnLst>
+      <p:par>
+        <p:cTn id="1" dur="indefinite" restart="never" nodeType="tmRoot"/>
+      </p:par>
+    </p:tnLst>
+  </p:timing>
 </p:sld>
 </file>
 
@@ -33605,6 +33876,13 @@
   <p:clrMapOvr>
     <a:masterClrMapping/>
   </p:clrMapOvr>
+  <p:timing>
+    <p:tnLst>
+      <p:par>
+        <p:cTn id="1" dur="indefinite" restart="never" nodeType="tmRoot"/>
+      </p:par>
+    </p:tnLst>
+  </p:timing>
 </p:sld>
 </file>
 
@@ -35240,6 +35518,13 @@
   <p:clrMapOvr>
     <a:masterClrMapping/>
   </p:clrMapOvr>
+  <p:timing>
+    <p:tnLst>
+      <p:par>
+        <p:cTn id="1" dur="indefinite" restart="never" nodeType="tmRoot"/>
+      </p:par>
+    </p:tnLst>
+  </p:timing>
 </p:sld>
 </file>
 
@@ -36578,6 +36863,13 @@
   <p:clrMapOvr>
     <a:masterClrMapping/>
   </p:clrMapOvr>
+  <p:timing>
+    <p:tnLst>
+      <p:par>
+        <p:cTn id="1" dur="indefinite" restart="never" nodeType="tmRoot"/>
+      </p:par>
+    </p:tnLst>
+  </p:timing>
 </p:sld>
 </file>
 
@@ -37330,6 +37622,13 @@
   <p:clrMapOvr>
     <a:masterClrMapping/>
   </p:clrMapOvr>
+  <p:timing>
+    <p:tnLst>
+      <p:par>
+        <p:cTn id="1" dur="indefinite" restart="never" nodeType="tmRoot"/>
+      </p:par>
+    </p:tnLst>
+  </p:timing>
 </p:sld>
 </file>
 
@@ -38380,7 +38679,7 @@
         <p:spPr>
           <a:xfrm>
             <a:off x="418120" y="1187336"/>
-            <a:ext cx="8553787" cy="2246769"/>
+            <a:ext cx="8553787" cy="2954655"/>
           </a:xfrm>
           <a:prstGeom prst="rect">
             <a:avLst/>
@@ -38405,10 +38704,10 @@
                 <a:ea typeface="ヒラギノ角ゴ Pro W3" charset="0"/>
                 <a:cs typeface="ヒラギノ角ゴ Pro W3" charset="0"/>
               </a:rPr>
-              <a:t>Sources for all examples that we covered you can find </a:t>
-            </a:r>
-            <a:r>
-              <a:rPr lang="en-US" sz="1400" dirty="0" smtClean="0">
+              <a:t>“Advanced </a:t>
+            </a:r>
+            <a:r>
+              <a:rPr lang="en-US" sz="1400" dirty="0">
                 <a:solidFill>
                   <a:srgbClr val="68717A"/>
                 </a:solidFill>
@@ -38416,7 +38715,51 @@
                 <a:ea typeface="ヒラギノ角ゴ Pro W3" charset="0"/>
                 <a:cs typeface="ヒラギノ角ゴ Pro W3" charset="0"/>
               </a:rPr>
-              <a:t>under this link: </a:t>
+              <a:t>C and C++ </a:t>
+            </a:r>
+            <a:r>
+              <a:rPr lang="en-US" sz="1400" dirty="0">
+                <a:solidFill>
+                  <a:srgbClr val="68717A"/>
+                </a:solidFill>
+                <a:latin typeface="Nokia Pure Headline Light"/>
+                <a:ea typeface="ヒラギノ角ゴ Pro W3" charset="0"/>
+                <a:cs typeface="ヒラギノ角ゴ Pro W3" charset="0"/>
+              </a:rPr>
+              <a:t>Compiling” Milan </a:t>
+            </a:r>
+            <a:r>
+              <a:rPr lang="en-US" sz="1400" dirty="0" err="1">
+                <a:solidFill>
+                  <a:srgbClr val="68717A"/>
+                </a:solidFill>
+                <a:latin typeface="Nokia Pure Headline Light"/>
+                <a:ea typeface="ヒラギノ角ゴ Pro W3" charset="0"/>
+                <a:cs typeface="ヒラギノ角ゴ Pro W3" charset="0"/>
+              </a:rPr>
+              <a:t>Stevanovic</a:t>
+            </a:r>
+            <a:r>
+              <a:rPr lang="en-US" sz="1400" dirty="0">
+                <a:solidFill>
+                  <a:srgbClr val="68717A"/>
+                </a:solidFill>
+                <a:latin typeface="Nokia Pure Headline Light"/>
+                <a:ea typeface="ヒラギノ角ゴ Pro W3" charset="0"/>
+                <a:cs typeface="ヒラギノ角ゴ Pro W3" charset="0"/>
+              </a:rPr>
+              <a:t> </a:t>
+            </a:r>
+            <a:r>
+              <a:rPr lang="en-US" sz="1400" dirty="0" smtClean="0">
+                <a:solidFill>
+                  <a:srgbClr val="68717A"/>
+                </a:solidFill>
+                <a:latin typeface="Nokia Pure Headline Light"/>
+                <a:ea typeface="ヒラギノ角ゴ Pro W3" charset="0"/>
+                <a:cs typeface="ヒラギノ角ゴ Pro W3" charset="0"/>
+              </a:rPr>
+              <a:t>(</a:t>
             </a:r>
             <a:r>
               <a:rPr lang="en-US" sz="1400" dirty="0" smtClean="0">
@@ -38428,10 +38771,96 @@
                 <a:cs typeface="ヒラギノ角ゴ Pro W3" charset="0"/>
                 <a:hlinkClick r:id="rId2"/>
               </a:rPr>
+              <a:t>http</a:t>
+            </a:r>
+            <a:r>
+              <a:rPr lang="en-US" sz="1400" dirty="0">
+                <a:solidFill>
+                  <a:srgbClr val="68717A"/>
+                </a:solidFill>
+                <a:latin typeface="Nokia Pure Headline Light"/>
+                <a:ea typeface="ヒラギノ角ゴ Pro W3" charset="0"/>
+                <a:cs typeface="ヒラギノ角ゴ Pro W3" charset="0"/>
+                <a:hlinkClick r:id="rId2"/>
+              </a:rPr>
+              <a:t>://</a:t>
+            </a:r>
+            <a:r>
+              <a:rPr lang="en-US" sz="1400" dirty="0" smtClean="0">
+                <a:solidFill>
+                  <a:srgbClr val="68717A"/>
+                </a:solidFill>
+                <a:latin typeface="Nokia Pure Headline Light"/>
+                <a:ea typeface="ヒラギノ角ゴ Pro W3" charset="0"/>
+                <a:cs typeface="ヒラギノ角ゴ Pro W3" charset="0"/>
+                <a:hlinkClick r:id="rId2"/>
+              </a:rPr>
+              <a:t>www.amazon.com/Advanced-C-Compiling-Milan-Stevanovic/dp/1430266678</a:t>
+            </a:r>
+            <a:r>
+              <a:rPr lang="en-US" sz="1400" dirty="0" smtClean="0">
+                <a:solidFill>
+                  <a:srgbClr val="68717A"/>
+                </a:solidFill>
+                <a:latin typeface="Nokia Pure Headline Light"/>
+                <a:ea typeface="ヒラギノ角ゴ Pro W3" charset="0"/>
+                <a:cs typeface="ヒラギノ角ゴ Pro W3" charset="0"/>
+              </a:rPr>
+              <a:t>).</a:t>
+            </a:r>
+            <a:endParaRPr lang="en-US" sz="1400" dirty="0" smtClean="0">
+              <a:solidFill>
+                <a:srgbClr val="68717A"/>
+              </a:solidFill>
+              <a:latin typeface="Nokia Pure Headline Light"/>
+              <a:ea typeface="ヒラギノ角ゴ Pro W3" charset="0"/>
+              <a:cs typeface="ヒラギノ角ゴ Pro W3" charset="0"/>
+            </a:endParaRPr>
+          </a:p>
+          <a:p>
+            <a:pPr marL="342900" indent="-342900" fontAlgn="t">
+              <a:buFontTx/>
+              <a:buAutoNum type="arabicPeriod"/>
+            </a:pPr>
+            <a:endParaRPr lang="en-US" sz="1400" dirty="0">
+              <a:solidFill>
+                <a:srgbClr val="68717A"/>
+              </a:solidFill>
+              <a:latin typeface="Nokia Pure Headline Light"/>
+              <a:ea typeface="ヒラギノ角ゴ Pro W3" charset="0"/>
+              <a:cs typeface="ヒラギノ角ゴ Pro W3" charset="0"/>
+            </a:endParaRPr>
+          </a:p>
+          <a:p>
+            <a:pPr marL="342900" indent="-342900" fontAlgn="t">
+              <a:buFontTx/>
+              <a:buAutoNum type="arabicPeriod"/>
+            </a:pPr>
+            <a:r>
+              <a:rPr lang="en-US" sz="1400" dirty="0">
+                <a:solidFill>
+                  <a:srgbClr val="68717A"/>
+                </a:solidFill>
+                <a:latin typeface="Nokia Pure Headline Light"/>
+                <a:ea typeface="ヒラギノ角ゴ Pro W3" charset="0"/>
+                <a:cs typeface="ヒラギノ角ゴ Pro W3" charset="0"/>
+              </a:rPr>
+              <a:t>Sources for all examples that we covered you can find under this link: </a:t>
+            </a:r>
+            <a:r>
+              <a:rPr lang="en-US" sz="1400" dirty="0">
+                <a:solidFill>
+                  <a:srgbClr val="68717A"/>
+                </a:solidFill>
+                <a:latin typeface="Nokia Pure Headline Light"/>
+                <a:ea typeface="ヒラギノ角ゴ Pro W3" charset="0"/>
+                <a:cs typeface="ヒラギノ角ゴ Pro W3" charset="0"/>
+                <a:hlinkClick r:id="rId3"/>
+              </a:rPr>
               <a:t>https://github.com/dendibakh/Linker</a:t>
             </a:r>
             <a:r>
-              <a:rPr lang="en-US" sz="1400" dirty="0" smtClean="0">
+              <a:rPr lang="en-US" sz="1400" dirty="0">
                 <a:solidFill>
                   <a:srgbClr val="68717A"/>
                 </a:solidFill>
@@ -38485,18 +38914,19 @@
                 <a:ea typeface="ヒラギノ角ゴ Pro W3" charset="0"/>
                 <a:cs typeface="ヒラギノ角ゴ Pro W3" charset="0"/>
               </a:rPr>
-              <a:t>David </a:t>
-            </a:r>
-            <a:r>
-              <a:rPr lang="en-US" sz="1400" dirty="0" err="1" smtClean="0">
+              <a:t>David Drysdale, Beginner's guide to linkers  (</a:t>
+            </a:r>
+            <a:r>
+              <a:rPr lang="en-US" sz="1400" dirty="0" smtClean="0">
                 <a:solidFill>
                   <a:srgbClr val="68717A"/>
                 </a:solidFill>
                 <a:latin typeface="Nokia Pure Headline Light"/>
                 <a:ea typeface="ヒラギノ角ゴ Pro W3" charset="0"/>
                 <a:cs typeface="ヒラギノ角ゴ Pro W3" charset="0"/>
-              </a:rPr>
-              <a:t>Drysdale</a:t>
+                <a:hlinkClick r:id="rId4"/>
+              </a:rPr>
+              <a:t>http://www.lurklurk.org/linkers/linkers.html</a:t>
             </a:r>
             <a:r>
               <a:rPr lang="en-US" sz="1400" dirty="0" smtClean="0">
@@ -38507,66 +38937,13 @@
                 <a:ea typeface="ヒラギノ角ゴ Pro W3" charset="0"/>
                 <a:cs typeface="ヒラギノ角ゴ Pro W3" charset="0"/>
               </a:rPr>
-              <a:t>, Beginner's guide to linkers </a:t>
-            </a:r>
-            <a:r>
-              <a:rPr lang="en-US" sz="1400" dirty="0" smtClean="0">
-                <a:solidFill>
-                  <a:srgbClr val="68717A"/>
-                </a:solidFill>
-                <a:latin typeface="Nokia Pure Headline Light"/>
-                <a:ea typeface="ヒラギノ角ゴ Pro W3" charset="0"/>
-                <a:cs typeface="ヒラギノ角ゴ Pro W3" charset="0"/>
-              </a:rPr>
-              <a:t> (</a:t>
-            </a:r>
-            <a:r>
-              <a:rPr lang="en-US" sz="1400" dirty="0" smtClean="0">
-                <a:solidFill>
-                  <a:srgbClr val="68717A"/>
-                </a:solidFill>
-                <a:latin typeface="Nokia Pure Headline Light"/>
-                <a:ea typeface="ヒラギノ角ゴ Pro W3" charset="0"/>
-                <a:cs typeface="ヒラギノ角ゴ Pro W3" charset="0"/>
-                <a:hlinkClick r:id="rId3"/>
-              </a:rPr>
-              <a:t>http</a:t>
-            </a:r>
-            <a:r>
-              <a:rPr lang="en-US" sz="1400" dirty="0" smtClean="0">
-                <a:solidFill>
-                  <a:srgbClr val="68717A"/>
-                </a:solidFill>
-                <a:latin typeface="Nokia Pure Headline Light"/>
-                <a:ea typeface="ヒラギノ角ゴ Pro W3" charset="0"/>
-                <a:cs typeface="ヒラギノ角ゴ Pro W3" charset="0"/>
-                <a:hlinkClick r:id="rId3"/>
-              </a:rPr>
-              <a:t>://</a:t>
-            </a:r>
-            <a:r>
-              <a:rPr lang="en-US" sz="1400" dirty="0" smtClean="0">
-                <a:solidFill>
-                  <a:srgbClr val="68717A"/>
-                </a:solidFill>
-                <a:latin typeface="Nokia Pure Headline Light"/>
-                <a:ea typeface="ヒラギノ角ゴ Pro W3" charset="0"/>
-                <a:cs typeface="ヒラギノ角ゴ Pro W3" charset="0"/>
-                <a:hlinkClick r:id="rId3"/>
-              </a:rPr>
-              <a:t>www.lurklurk.org/linkers/linkers.html</a:t>
-            </a:r>
-            <a:r>
-              <a:rPr lang="en-US" sz="1400" dirty="0" smtClean="0">
-                <a:solidFill>
-                  <a:srgbClr val="68717A"/>
-                </a:solidFill>
-                <a:latin typeface="Nokia Pure Headline Light"/>
-                <a:ea typeface="ヒラギノ角ゴ Pro W3" charset="0"/>
-                <a:cs typeface="ヒラギノ角ゴ Pro W3" charset="0"/>
-              </a:rPr>
               <a:t>).</a:t>
             </a:r>
+          </a:p>
+          <a:p>
+            <a:pPr marL="342900" indent="-342900" fontAlgn="t">
+              <a:buAutoNum type="arabicPeriod"/>
+            </a:pPr>
             <a:endParaRPr lang="en-US" sz="1400" dirty="0" smtClean="0">
               <a:solidFill>
                 <a:srgbClr val="68717A"/>
@@ -38578,6 +38955,79 @@
           </a:p>
           <a:p>
             <a:pPr marL="342900" indent="-342900" fontAlgn="t">
+              <a:buFontTx/>
+              <a:buAutoNum type="arabicPeriod"/>
+            </a:pPr>
+            <a:r>
+              <a:rPr lang="en-US" sz="1400" dirty="0" smtClean="0">
+                <a:solidFill>
+                  <a:srgbClr val="68717A"/>
+                </a:solidFill>
+                <a:latin typeface="Nokia Pure Headline Light"/>
+                <a:ea typeface="ヒラギノ角ゴ Pro W3" charset="0"/>
+                <a:cs typeface="ヒラギノ角ゴ Pro W3" charset="0"/>
+              </a:rPr>
+              <a:t>Alexander </a:t>
+            </a:r>
+            <a:r>
+              <a:rPr lang="en-US" sz="1400" dirty="0" err="1" smtClean="0">
+                <a:solidFill>
+                  <a:srgbClr val="68717A"/>
+                </a:solidFill>
+                <a:latin typeface="Nokia Pure Headline Light"/>
+                <a:ea typeface="ヒラギノ角ゴ Pro W3" charset="0"/>
+                <a:cs typeface="ヒラギノ角ゴ Pro W3" charset="0"/>
+              </a:rPr>
+              <a:t>Bernauer‘s</a:t>
+            </a:r>
+            <a:r>
+              <a:rPr lang="en-US" sz="1400" dirty="0" smtClean="0">
+                <a:solidFill>
+                  <a:srgbClr val="68717A"/>
+                </a:solidFill>
+                <a:latin typeface="Nokia Pure Headline Light"/>
+                <a:ea typeface="ヒラギノ角ゴ Pro W3" charset="0"/>
+                <a:cs typeface="ヒラギノ角ゴ Pro W3" charset="0"/>
+              </a:rPr>
+              <a:t> </a:t>
+            </a:r>
+            <a:r>
+              <a:rPr lang="en-US" sz="1400" dirty="0" smtClean="0">
+                <a:solidFill>
+                  <a:srgbClr val="68717A"/>
+                </a:solidFill>
+                <a:latin typeface="Nokia Pure Headline Light"/>
+                <a:ea typeface="ヒラギノ角ゴ Pro W3" charset="0"/>
+                <a:cs typeface="ヒラギノ角ゴ Pro W3" charset="0"/>
+              </a:rPr>
+              <a:t>blog (</a:t>
+            </a:r>
+            <a:r>
+              <a:rPr lang="en-US" sz="1400" dirty="0" smtClean="0">
+                <a:solidFill>
+                  <a:srgbClr val="68717A"/>
+                </a:solidFill>
+                <a:latin typeface="Nokia Pure Headline Light"/>
+                <a:ea typeface="ヒラギノ角ゴ Pro W3" charset="0"/>
+                <a:cs typeface="ヒラギノ角ゴ Pro W3" charset="0"/>
+                <a:hlinkClick r:id="rId5"/>
+              </a:rPr>
+              <a:t>http://blog.copton.net/articles/linker/</a:t>
+            </a:r>
+            <a:r>
+              <a:rPr lang="en-US" sz="1400" dirty="0" smtClean="0">
+                <a:solidFill>
+                  <a:srgbClr val="68717A"/>
+                </a:solidFill>
+                <a:latin typeface="Nokia Pure Headline Light"/>
+                <a:ea typeface="ヒラギノ角ゴ Pro W3" charset="0"/>
+                <a:cs typeface="ヒラギノ角ゴ Pro W3" charset="0"/>
+              </a:rPr>
+              <a:t>).</a:t>
+            </a:r>
+          </a:p>
+          <a:p>
+            <a:pPr marL="342900" indent="-342900" fontAlgn="t">
               <a:buAutoNum type="arabicPeriod"/>
             </a:pPr>
             <a:endParaRPr lang="en-US" sz="1400" dirty="0" smtClean="0">
@@ -38602,88 +39052,9 @@
                 <a:latin typeface="Nokia Pure Headline Light"/>
                 <a:ea typeface="ヒラギノ角ゴ Pro W3" charset="0"/>
                 <a:cs typeface="ヒラギノ角ゴ Pro W3" charset="0"/>
-              </a:rPr>
-              <a:t>Alexander </a:t>
-            </a:r>
-            <a:r>
-              <a:rPr lang="en-US" sz="1400" dirty="0" err="1" smtClean="0">
-                <a:solidFill>
-                  <a:srgbClr val="68717A"/>
-                </a:solidFill>
-                <a:latin typeface="Nokia Pure Headline Light"/>
-                <a:ea typeface="ヒラギノ角ゴ Pro W3" charset="0"/>
-                <a:cs typeface="ヒラギノ角ゴ Pro W3" charset="0"/>
-              </a:rPr>
-              <a:t>Bernauer</a:t>
-            </a:r>
-            <a:r>
-              <a:rPr lang="en-US" sz="1400" dirty="0" smtClean="0">
-                <a:solidFill>
-                  <a:srgbClr val="68717A"/>
-                </a:solidFill>
-                <a:latin typeface="Nokia Pure Headline Light"/>
-                <a:ea typeface="ヒラギノ角ゴ Pro W3" charset="0"/>
-                <a:cs typeface="ヒラギノ角ゴ Pro W3" charset="0"/>
-              </a:rPr>
-              <a:t> </a:t>
-            </a:r>
-            <a:r>
-              <a:rPr lang="en-US" sz="1400" dirty="0" smtClean="0">
-                <a:solidFill>
-                  <a:srgbClr val="68717A"/>
-                </a:solidFill>
-                <a:latin typeface="Nokia Pure Headline Light"/>
-                <a:ea typeface="ヒラギノ角ゴ Pro W3" charset="0"/>
-                <a:cs typeface="ヒラギノ角ゴ Pro W3" charset="0"/>
-              </a:rPr>
-              <a:t>‘s blog (</a:t>
-            </a:r>
-            <a:r>
-              <a:rPr lang="en-US" sz="1400" dirty="0" smtClean="0">
-                <a:solidFill>
-                  <a:srgbClr val="68717A"/>
-                </a:solidFill>
-                <a:latin typeface="Nokia Pure Headline Light"/>
-                <a:ea typeface="ヒラギノ角ゴ Pro W3" charset="0"/>
-                <a:cs typeface="ヒラギノ角ゴ Pro W3" charset="0"/>
-                <a:hlinkClick r:id="rId4"/>
-              </a:rPr>
-              <a:t>http</a:t>
-            </a:r>
-            <a:r>
-              <a:rPr lang="en-US" sz="1400" dirty="0" smtClean="0">
-                <a:solidFill>
-                  <a:srgbClr val="68717A"/>
-                </a:solidFill>
-                <a:latin typeface="Nokia Pure Headline Light"/>
-                <a:ea typeface="ヒラギノ角ゴ Pro W3" charset="0"/>
-                <a:cs typeface="ヒラギノ角ゴ Pro W3" charset="0"/>
-                <a:hlinkClick r:id="rId4"/>
-              </a:rPr>
-              <a:t>://blog.copton.net/articles/linker</a:t>
-            </a:r>
-            <a:r>
-              <a:rPr lang="en-US" sz="1400" dirty="0" smtClean="0">
-                <a:solidFill>
-                  <a:srgbClr val="68717A"/>
-                </a:solidFill>
-                <a:latin typeface="Nokia Pure Headline Light"/>
-                <a:ea typeface="ヒラギノ角ゴ Pro W3" charset="0"/>
-                <a:cs typeface="ヒラギノ角ゴ Pro W3" charset="0"/>
-                <a:hlinkClick r:id="rId4"/>
-              </a:rPr>
-              <a:t>/</a:t>
-            </a:r>
-            <a:r>
-              <a:rPr lang="en-US" sz="1400" dirty="0" smtClean="0">
-                <a:solidFill>
-                  <a:srgbClr val="68717A"/>
-                </a:solidFill>
-                <a:latin typeface="Nokia Pure Headline Light"/>
-                <a:ea typeface="ヒラギノ角ゴ Pro W3" charset="0"/>
-                <a:cs typeface="ヒラギノ角ゴ Pro W3" charset="0"/>
-              </a:rPr>
-              <a:t>).</a:t>
+                <a:hlinkClick r:id="rId6"/>
+              </a:rPr>
+              <a:t>http://stackoverflow.com/questions/31495877/i-receive-different-results-on-unix-and-win-when-use-static-members-with-static</a:t>
             </a:r>
             <a:endParaRPr lang="en-US" sz="1400" dirty="0" smtClean="0">
               <a:solidFill>
@@ -38705,52 +39076,13 @@
               <a:latin typeface="Nokia Pure Headline Light"/>
               <a:ea typeface="ヒラギノ角ゴ Pro W3" charset="0"/>
               <a:cs typeface="ヒラギノ角ゴ Pro W3" charset="0"/>
-            </a:endParaRPr>
-          </a:p>
-          <a:p>
-            <a:pPr marL="342900" indent="-342900" fontAlgn="t">
-              <a:buFontTx/>
-              <a:buAutoNum type="arabicPeriod"/>
-            </a:pPr>
-            <a:r>
-              <a:rPr lang="en-US" sz="1400" dirty="0" smtClean="0">
-                <a:solidFill>
-                  <a:srgbClr val="68717A"/>
-                </a:solidFill>
-                <a:latin typeface="Nokia Pure Headline Light"/>
-                <a:ea typeface="ヒラギノ角ゴ Pro W3" charset="0"/>
-                <a:cs typeface="ヒラギノ角ゴ Pro W3" charset="0"/>
-                <a:hlinkClick r:id="rId5"/>
-              </a:rPr>
-              <a:t>http://stackoverflow.com/questions/31495877/i-receive-different-results-on-unix-and-win-when-use-static-members-with-static</a:t>
-            </a:r>
-            <a:endParaRPr lang="en-US" sz="1400" dirty="0" smtClean="0">
-              <a:solidFill>
-                <a:srgbClr val="68717A"/>
-              </a:solidFill>
-              <a:latin typeface="Nokia Pure Headline Light"/>
-              <a:ea typeface="ヒラギノ角ゴ Pro W3" charset="0"/>
-              <a:cs typeface="ヒラギノ角ゴ Pro W3" charset="0"/>
+              <a:hlinkClick r:id="rId7"/>
             </a:endParaRPr>
           </a:p>
           <a:p>
             <a:pPr marL="342900" indent="-342900" fontAlgn="t">
               <a:buAutoNum type="arabicPeriod"/>
             </a:pPr>
-            <a:endParaRPr lang="en-US" sz="1400" dirty="0" smtClean="0">
-              <a:solidFill>
-                <a:srgbClr val="68717A"/>
-              </a:solidFill>
-              <a:latin typeface="Nokia Pure Headline Light"/>
-              <a:ea typeface="ヒラギノ角ゴ Pro W3" charset="0"/>
-              <a:cs typeface="ヒラギノ角ゴ Pro W3" charset="0"/>
-              <a:hlinkClick r:id="rId6"/>
-            </a:endParaRPr>
-          </a:p>
-          <a:p>
-            <a:pPr marL="342900" indent="-342900" fontAlgn="t">
-              <a:buAutoNum type="arabicPeriod"/>
-            </a:pPr>
             <a:r>
               <a:rPr lang="en-US" sz="1400" dirty="0" smtClean="0">
                 <a:solidFill>
@@ -38759,21 +39091,9 @@
                 <a:latin typeface="Nokia Pure Headline Light"/>
                 <a:ea typeface="ヒラギノ角ゴ Pro W3" charset="0"/>
                 <a:cs typeface="ヒラギノ角ゴ Pro W3" charset="0"/>
-                <a:hlinkClick r:id="rId6"/>
-              </a:rPr>
-              <a:t>https</a:t>
-            </a:r>
-            <a:r>
-              <a:rPr lang="en-US" sz="1400" dirty="0" smtClean="0">
-                <a:solidFill>
-                  <a:srgbClr val="68717A"/>
-                </a:solidFill>
-                <a:latin typeface="Nokia Pure Headline Light"/>
-                <a:ea typeface="ヒラギノ角ゴ Pro W3" charset="0"/>
-                <a:cs typeface="ヒラギノ角ゴ Pro W3" charset="0"/>
-                <a:hlinkClick r:id="rId6"/>
-              </a:rPr>
-              <a:t>://sourceware.org/binutils/docs/binutils</a:t>
+                <a:hlinkClick r:id="rId7"/>
+              </a:rPr>
+              <a:t>https://sourceware.org/binutils/docs/binutils</a:t>
             </a:r>
             <a:r>
               <a:rPr lang="en-US" sz="1400" dirty="0" smtClean="0">
@@ -38794,6 +39114,13 @@
   <p:clrMapOvr>
     <a:masterClrMapping/>
   </p:clrMapOvr>
+  <p:timing>
+    <p:tnLst>
+      <p:par>
+        <p:cTn id="1" dur="indefinite" restart="never" nodeType="tmRoot"/>
+      </p:par>
+    </p:tnLst>
+  </p:timing>
 </p:sld>
 </file>
 
@@ -39953,6 +40280,13 @@
   <p:clrMapOvr>
     <a:masterClrMapping/>
   </p:clrMapOvr>
+  <p:timing>
+    <p:tnLst>
+      <p:par>
+        <p:cTn id="1" dur="indefinite" restart="never" nodeType="tmRoot"/>
+      </p:par>
+    </p:tnLst>
+  </p:timing>
 </p:sld>
 </file>
 
@@ -40515,6 +40849,13 @@
   <p:clrMapOvr>
     <a:masterClrMapping/>
   </p:clrMapOvr>
+  <p:timing>
+    <p:tnLst>
+      <p:par>
+        <p:cTn id="1" dur="indefinite" restart="never" nodeType="tmRoot"/>
+      </p:par>
+    </p:tnLst>
+  </p:timing>
 </p:sld>
 </file>
 
@@ -41400,12 +41741,25 @@
   <p:clrMapOvr>
     <a:masterClrMapping/>
   </p:clrMapOvr>
+  <p:timing>
+    <p:tnLst>
+      <p:par>
+        <p:cTn id="1" dur="indefinite" restart="never" nodeType="tmRoot"/>
+      </p:par>
+    </p:tnLst>
+  </p:timing>
 </p:sld>
 </file>
 
 <file path=ppt/tags/tag1.xml><?xml version="1.0" encoding="utf-8"?>
 <p:tagLst xmlns:a="http://schemas.openxmlformats.org/drawingml/2006/main" xmlns:r="http://schemas.openxmlformats.org/officeDocument/2006/relationships" xmlns:p="http://schemas.openxmlformats.org/presentationml/2006/main">
   <p:tag name="THINKCELLUNDODONOTDELETE" val="0"/>
+</p:tagLst>
+</file>
+
+<file path=ppt/tags/tag2.xml><?xml version="1.0" encoding="utf-8"?>
+<p:tagLst xmlns:a="http://schemas.openxmlformats.org/drawingml/2006/main" xmlns:r="http://schemas.openxmlformats.org/officeDocument/2006/relationships" xmlns:p="http://schemas.openxmlformats.org/presentationml/2006/main">
+  <p:tag name="THINKCELLSHAPEDONOTDELETE" val="thinkcellActiveDocDoNotDelete"/>
 </p:tagLst>
 </file>
 
@@ -41697,7 +42051,7 @@
   <a:extraClrSchemeLst/>
   <a:extLst>
     <a:ext uri="{05A4C25C-085E-4340-85A3-A5531E510DB2}">
-      <thm15:themeFamily xmlns="" xmlns:thm15="http://schemas.microsoft.com/office/thememl/2012/main" name="Nokia PowerPoint Template Nokia Pure v12" id="{7AC05BEF-BBDF-4CF1-AA23-A676535EABCE}" vid="{991539CA-B441-4AED-8339-F6770207F6A2}"/>
+      <thm15:themeFamily xmlns:thm15="http://schemas.microsoft.com/office/thememl/2012/main" name="Nokia PowerPoint Template Nokia Pure v12" id="{7AC05BEF-BBDF-4CF1-AA23-A676535EABCE}" vid="{991539CA-B441-4AED-8339-F6770207F6A2}"/>
     </a:ext>
   </a:extLst>
 </a:theme>
@@ -42006,7 +42360,7 @@
   <a:extraClrSchemeLst/>
   <a:extLst>
     <a:ext uri="{05A4C25C-085E-4340-85A3-A5531E510DB2}">
-      <thm15:themeFamily xmlns="" xmlns:thm15="http://schemas.microsoft.com/office/thememl/2012/main" name="Nokia PowerPoint Template Nokia Pure v12" id="{7AC05BEF-BBDF-4CF1-AA23-A676535EABCE}" vid="{AF106B15-0C1E-44CE-A53A-F2CB8A6EA7E7}"/>
+      <thm15:themeFamily xmlns:thm15="http://schemas.microsoft.com/office/thememl/2012/main" name="Nokia PowerPoint Template Nokia Pure v12" id="{7AC05BEF-BBDF-4CF1-AA23-A676535EABCE}" vid="{AF106B15-0C1E-44CE-A53A-F2CB8A6EA7E7}"/>
     </a:ext>
   </a:extLst>
 </a:theme>

</xml_diff>